<commit_message>
Updated ppt and removed unused properites from GUI
</commit_message>
<xml_diff>
--- a/Docs/ppt/Atmoszféra szimuláció.pptx
+++ b/Docs/ppt/Atmoszféra szimuláció.pptx
@@ -15,6 +15,7 @@
     <p:sldId id="259" r:id="rId9"/>
     <p:sldId id="264" r:id="rId10"/>
     <p:sldId id="265" r:id="rId11"/>
+    <p:sldId id="266" r:id="rId12"/>
   </p:sldIdLst>
   <p:sldSz cx="12192000" cy="6858000"/>
   <p:notesSz cx="6858000" cy="9144000"/>
@@ -113,6 +114,11 @@
       </a:defRPr>
     </a:lvl9pPr>
   </p:defaultTextStyle>
+  <p:extLst>
+    <p:ext uri="{EFAFB233-063F-42B5-8137-9DF3F51BA10A}">
+      <p15:sldGuideLst xmlns:p15="http://schemas.microsoft.com/office/powerpoint/2012/main"/>
+    </p:ext>
+  </p:extLst>
 </p:presentation>
 </file>
 
@@ -246,7 +252,7 @@
           </a:lstStyle>
           <a:p>
             <a:r>
-              <a:rPr lang="en-US" smtClean="0"/>
+              <a:rPr lang="en-US"/>
               <a:t>Click to edit Master title style</a:t>
             </a:r>
             <a:endParaRPr lang="en-US" dirty="0"/>
@@ -318,7 +324,7 @@
           </a:lstStyle>
           <a:p>
             <a:r>
-              <a:rPr lang="en-US" smtClean="0"/>
+              <a:rPr lang="en-US"/>
               <a:t>Click to edit Master subtitle style</a:t>
             </a:r>
             <a:endParaRPr lang="en-US" dirty="0"/>
@@ -474,7 +480,7 @@
           <a:lstStyle/>
           <a:p>
             <a:r>
-              <a:rPr lang="en-US" smtClean="0"/>
+              <a:rPr lang="en-US"/>
               <a:t>Click to edit Master title style</a:t>
             </a:r>
             <a:endParaRPr lang="en-US" dirty="0"/>
@@ -498,35 +504,35 @@
           <a:p>
             <a:pPr lvl="0"/>
             <a:r>
-              <a:rPr lang="en-US" smtClean="0"/>
+              <a:rPr lang="en-US"/>
               <a:t>Click to edit Master text styles</a:t>
             </a:r>
           </a:p>
           <a:p>
             <a:pPr lvl="1"/>
             <a:r>
-              <a:rPr lang="en-US" smtClean="0"/>
+              <a:rPr lang="en-US"/>
               <a:t>Second level</a:t>
             </a:r>
           </a:p>
           <a:p>
             <a:pPr lvl="2"/>
             <a:r>
-              <a:rPr lang="en-US" smtClean="0"/>
+              <a:rPr lang="en-US"/>
               <a:t>Third level</a:t>
             </a:r>
           </a:p>
           <a:p>
             <a:pPr lvl="3"/>
             <a:r>
-              <a:rPr lang="en-US" smtClean="0"/>
+              <a:rPr lang="en-US"/>
               <a:t>Fourth level</a:t>
             </a:r>
           </a:p>
           <a:p>
             <a:pPr lvl="4"/>
             <a:r>
-              <a:rPr lang="en-US" smtClean="0"/>
+              <a:rPr lang="en-US"/>
               <a:t>Fifth level</a:t>
             </a:r>
             <a:endParaRPr lang="en-US" dirty="0"/>
@@ -725,7 +731,7 @@
           <a:lstStyle/>
           <a:p>
             <a:r>
-              <a:rPr lang="en-US" smtClean="0"/>
+              <a:rPr lang="en-US"/>
               <a:t>Click to edit Master title style</a:t>
             </a:r>
             <a:endParaRPr lang="en-US" dirty="0"/>
@@ -754,35 +760,35 @@
           <a:p>
             <a:pPr lvl="0"/>
             <a:r>
-              <a:rPr lang="en-US" smtClean="0"/>
+              <a:rPr lang="en-US"/>
               <a:t>Click to edit Master text styles</a:t>
             </a:r>
           </a:p>
           <a:p>
             <a:pPr lvl="1"/>
             <a:r>
-              <a:rPr lang="en-US" smtClean="0"/>
+              <a:rPr lang="en-US"/>
               <a:t>Second level</a:t>
             </a:r>
           </a:p>
           <a:p>
             <a:pPr lvl="2"/>
             <a:r>
-              <a:rPr lang="en-US" smtClean="0"/>
+              <a:rPr lang="en-US"/>
               <a:t>Third level</a:t>
             </a:r>
           </a:p>
           <a:p>
             <a:pPr lvl="3"/>
             <a:r>
-              <a:rPr lang="en-US" smtClean="0"/>
+              <a:rPr lang="en-US"/>
               <a:t>Fourth level</a:t>
             </a:r>
           </a:p>
           <a:p>
             <a:pPr lvl="4"/>
             <a:r>
-              <a:rPr lang="en-US" smtClean="0"/>
+              <a:rPr lang="en-US"/>
               <a:t>Fifth level</a:t>
             </a:r>
             <a:endParaRPr lang="en-US" dirty="0"/>
@@ -904,7 +910,7 @@
           </a:lstStyle>
           <a:p>
             <a:r>
-              <a:rPr lang="en-US" smtClean="0"/>
+              <a:rPr lang="en-US"/>
               <a:t>Click to edit Master title style</a:t>
             </a:r>
             <a:endParaRPr lang="en-US" dirty="0"/>
@@ -928,35 +934,35 @@
           <a:p>
             <a:pPr lvl="0"/>
             <a:r>
-              <a:rPr lang="en-US" smtClean="0"/>
+              <a:rPr lang="en-US"/>
               <a:t>Click to edit Master text styles</a:t>
             </a:r>
           </a:p>
           <a:p>
             <a:pPr lvl="1"/>
             <a:r>
-              <a:rPr lang="en-US" smtClean="0"/>
+              <a:rPr lang="en-US"/>
               <a:t>Second level</a:t>
             </a:r>
           </a:p>
           <a:p>
             <a:pPr lvl="2"/>
             <a:r>
-              <a:rPr lang="en-US" smtClean="0"/>
+              <a:rPr lang="en-US"/>
               <a:t>Third level</a:t>
             </a:r>
           </a:p>
           <a:p>
             <a:pPr lvl="3"/>
             <a:r>
-              <a:rPr lang="en-US" smtClean="0"/>
+              <a:rPr lang="en-US"/>
               <a:t>Fourth level</a:t>
             </a:r>
           </a:p>
           <a:p>
             <a:pPr lvl="4"/>
             <a:r>
-              <a:rPr lang="en-US" smtClean="0"/>
+              <a:rPr lang="en-US"/>
               <a:t>Fifth level</a:t>
             </a:r>
             <a:endParaRPr lang="en-US" dirty="0"/>
@@ -1179,7 +1185,7 @@
           </a:lstStyle>
           <a:p>
             <a:r>
-              <a:rPr lang="en-US" smtClean="0"/>
+              <a:rPr lang="en-US"/>
               <a:t>Click to edit Master title style</a:t>
             </a:r>
             <a:endParaRPr lang="en-US" dirty="0"/>
@@ -1300,7 +1306,7 @@
           <a:p>
             <a:pPr lvl="0"/>
             <a:r>
-              <a:rPr lang="en-US" smtClean="0"/>
+              <a:rPr lang="en-US"/>
               <a:t>Click to edit Master text styles</a:t>
             </a:r>
           </a:p>
@@ -1460,7 +1466,7 @@
           <a:lstStyle/>
           <a:p>
             <a:r>
-              <a:rPr lang="en-US" smtClean="0"/>
+              <a:rPr lang="en-US"/>
               <a:t>Click to edit Master title style</a:t>
             </a:r>
             <a:endParaRPr lang="en-US" dirty="0"/>
@@ -1489,35 +1495,35 @@
           <a:p>
             <a:pPr lvl="0"/>
             <a:r>
-              <a:rPr lang="en-US" smtClean="0"/>
+              <a:rPr lang="en-US"/>
               <a:t>Click to edit Master text styles</a:t>
             </a:r>
           </a:p>
           <a:p>
             <a:pPr lvl="1"/>
             <a:r>
-              <a:rPr lang="en-US" smtClean="0"/>
+              <a:rPr lang="en-US"/>
               <a:t>Second level</a:t>
             </a:r>
           </a:p>
           <a:p>
             <a:pPr lvl="2"/>
             <a:r>
-              <a:rPr lang="en-US" smtClean="0"/>
+              <a:rPr lang="en-US"/>
               <a:t>Third level</a:t>
             </a:r>
           </a:p>
           <a:p>
             <a:pPr lvl="3"/>
             <a:r>
-              <a:rPr lang="en-US" smtClean="0"/>
+              <a:rPr lang="en-US"/>
               <a:t>Fourth level</a:t>
             </a:r>
           </a:p>
           <a:p>
             <a:pPr lvl="4"/>
             <a:r>
-              <a:rPr lang="en-US" smtClean="0"/>
+              <a:rPr lang="en-US"/>
               <a:t>Fifth level</a:t>
             </a:r>
             <a:endParaRPr lang="en-US" dirty="0"/>
@@ -1546,35 +1552,35 @@
           <a:p>
             <a:pPr lvl="0"/>
             <a:r>
-              <a:rPr lang="en-US" smtClean="0"/>
+              <a:rPr lang="en-US"/>
               <a:t>Click to edit Master text styles</a:t>
             </a:r>
           </a:p>
           <a:p>
             <a:pPr lvl="1"/>
             <a:r>
-              <a:rPr lang="en-US" smtClean="0"/>
+              <a:rPr lang="en-US"/>
               <a:t>Second level</a:t>
             </a:r>
           </a:p>
           <a:p>
             <a:pPr lvl="2"/>
             <a:r>
-              <a:rPr lang="en-US" smtClean="0"/>
+              <a:rPr lang="en-US"/>
               <a:t>Third level</a:t>
             </a:r>
           </a:p>
           <a:p>
             <a:pPr lvl="3"/>
             <a:r>
-              <a:rPr lang="en-US" smtClean="0"/>
+              <a:rPr lang="en-US"/>
               <a:t>Fourth level</a:t>
             </a:r>
           </a:p>
           <a:p>
             <a:pPr lvl="4"/>
             <a:r>
-              <a:rPr lang="en-US" smtClean="0"/>
+              <a:rPr lang="en-US"/>
               <a:t>Fifth level</a:t>
             </a:r>
             <a:endParaRPr lang="en-US" dirty="0"/>
@@ -1697,7 +1703,7 @@
           <a:lstStyle/>
           <a:p>
             <a:r>
-              <a:rPr lang="en-US" smtClean="0"/>
+              <a:rPr lang="en-US"/>
               <a:t>Click to edit Master title style</a:t>
             </a:r>
             <a:endParaRPr lang="en-US" dirty="0"/>
@@ -1769,7 +1775,7 @@
           <a:p>
             <a:pPr lvl="0"/>
             <a:r>
-              <a:rPr lang="en-US" smtClean="0"/>
+              <a:rPr lang="en-US"/>
               <a:t>Click to edit Master text styles</a:t>
             </a:r>
           </a:p>
@@ -1797,35 +1803,35 @@
           <a:p>
             <a:pPr lvl="0"/>
             <a:r>
-              <a:rPr lang="en-US" smtClean="0"/>
+              <a:rPr lang="en-US"/>
               <a:t>Click to edit Master text styles</a:t>
             </a:r>
           </a:p>
           <a:p>
             <a:pPr lvl="1"/>
             <a:r>
-              <a:rPr lang="en-US" smtClean="0"/>
+              <a:rPr lang="en-US"/>
               <a:t>Second level</a:t>
             </a:r>
           </a:p>
           <a:p>
             <a:pPr lvl="2"/>
             <a:r>
-              <a:rPr lang="en-US" smtClean="0"/>
+              <a:rPr lang="en-US"/>
               <a:t>Third level</a:t>
             </a:r>
           </a:p>
           <a:p>
             <a:pPr lvl="3"/>
             <a:r>
-              <a:rPr lang="en-US" smtClean="0"/>
+              <a:rPr lang="en-US"/>
               <a:t>Fourth level</a:t>
             </a:r>
           </a:p>
           <a:p>
             <a:pPr lvl="4"/>
             <a:r>
-              <a:rPr lang="en-US" smtClean="0"/>
+              <a:rPr lang="en-US"/>
               <a:t>Fifth level</a:t>
             </a:r>
             <a:endParaRPr lang="en-US" dirty="0"/>
@@ -1897,7 +1903,7 @@
           <a:p>
             <a:pPr lvl="0"/>
             <a:r>
-              <a:rPr lang="en-US" smtClean="0"/>
+              <a:rPr lang="en-US"/>
               <a:t>Click to edit Master text styles</a:t>
             </a:r>
           </a:p>
@@ -1925,35 +1931,35 @@
           <a:p>
             <a:pPr lvl="0"/>
             <a:r>
-              <a:rPr lang="en-US" smtClean="0"/>
+              <a:rPr lang="en-US"/>
               <a:t>Click to edit Master text styles</a:t>
             </a:r>
           </a:p>
           <a:p>
             <a:pPr lvl="1"/>
             <a:r>
-              <a:rPr lang="en-US" smtClean="0"/>
+              <a:rPr lang="en-US"/>
               <a:t>Second level</a:t>
             </a:r>
           </a:p>
           <a:p>
             <a:pPr lvl="2"/>
             <a:r>
-              <a:rPr lang="en-US" smtClean="0"/>
+              <a:rPr lang="en-US"/>
               <a:t>Third level</a:t>
             </a:r>
           </a:p>
           <a:p>
             <a:pPr lvl="3"/>
             <a:r>
-              <a:rPr lang="en-US" smtClean="0"/>
+              <a:rPr lang="en-US"/>
               <a:t>Fourth level</a:t>
             </a:r>
           </a:p>
           <a:p>
             <a:pPr lvl="4"/>
             <a:r>
-              <a:rPr lang="en-US" smtClean="0"/>
+              <a:rPr lang="en-US"/>
               <a:t>Fifth level</a:t>
             </a:r>
             <a:endParaRPr lang="en-US" dirty="0"/>
@@ -2071,7 +2077,7 @@
           <a:lstStyle/>
           <a:p>
             <a:r>
-              <a:rPr lang="en-US" smtClean="0"/>
+              <a:rPr lang="en-US"/>
               <a:t>Click to edit Master title style</a:t>
             </a:r>
             <a:endParaRPr lang="en-US" dirty="0"/>
@@ -2459,7 +2465,7 @@
           </a:lstStyle>
           <a:p>
             <a:r>
-              <a:rPr lang="en-US" smtClean="0"/>
+              <a:rPr lang="en-US"/>
               <a:t>Click to edit Master title style</a:t>
             </a:r>
             <a:endParaRPr lang="en-US" dirty="0"/>
@@ -2488,35 +2494,35 @@
           <a:p>
             <a:pPr lvl="0"/>
             <a:r>
-              <a:rPr lang="en-US" smtClean="0"/>
+              <a:rPr lang="en-US"/>
               <a:t>Click to edit Master text styles</a:t>
             </a:r>
           </a:p>
           <a:p>
             <a:pPr lvl="1"/>
             <a:r>
-              <a:rPr lang="en-US" smtClean="0"/>
+              <a:rPr lang="en-US"/>
               <a:t>Second level</a:t>
             </a:r>
           </a:p>
           <a:p>
             <a:pPr lvl="2"/>
             <a:r>
-              <a:rPr lang="en-US" smtClean="0"/>
+              <a:rPr lang="en-US"/>
               <a:t>Third level</a:t>
             </a:r>
           </a:p>
           <a:p>
             <a:pPr lvl="3"/>
             <a:r>
-              <a:rPr lang="en-US" smtClean="0"/>
+              <a:rPr lang="en-US"/>
               <a:t>Fourth level</a:t>
             </a:r>
           </a:p>
           <a:p>
             <a:pPr lvl="4"/>
             <a:r>
-              <a:rPr lang="en-US" smtClean="0"/>
+              <a:rPr lang="en-US"/>
               <a:t>Fifth level</a:t>
             </a:r>
             <a:endParaRPr lang="en-US" dirty="0"/>
@@ -2588,7 +2594,7 @@
           <a:p>
             <a:pPr lvl="0"/>
             <a:r>
-              <a:rPr lang="en-US" smtClean="0"/>
+              <a:rPr lang="en-US"/>
               <a:t>Click to edit Master text styles</a:t>
             </a:r>
           </a:p>
@@ -2826,7 +2832,7 @@
           </a:lstStyle>
           <a:p>
             <a:r>
-              <a:rPr lang="en-US" smtClean="0"/>
+              <a:rPr lang="en-US"/>
               <a:t>Click to edit Master title style</a:t>
             </a:r>
             <a:endParaRPr lang="en-US" dirty="0"/>
@@ -2901,7 +2907,7 @@
           </a:lstStyle>
           <a:p>
             <a:r>
-              <a:rPr lang="en-US" smtClean="0"/>
+              <a:rPr lang="en-US"/>
               <a:t>Click icon to add picture</a:t>
             </a:r>
             <a:endParaRPr lang="en-US" dirty="0"/>
@@ -2979,7 +2985,7 @@
           <a:p>
             <a:pPr lvl="0"/>
             <a:r>
-              <a:rPr lang="en-US" smtClean="0"/>
+              <a:rPr lang="en-US"/>
               <a:t>Click to edit Master text styles</a:t>
             </a:r>
           </a:p>
@@ -3187,7 +3193,7 @@
           <a:lstStyle/>
           <a:p>
             <a:r>
-              <a:rPr lang="en-US" smtClean="0"/>
+              <a:rPr lang="en-US"/>
               <a:t>Click to edit Master title style</a:t>
             </a:r>
             <a:endParaRPr lang="en-US" dirty="0"/>
@@ -3221,35 +3227,35 @@
           <a:p>
             <a:pPr lvl="0"/>
             <a:r>
-              <a:rPr lang="en-US" smtClean="0"/>
+              <a:rPr lang="en-US"/>
               <a:t>Click to edit Master text styles</a:t>
             </a:r>
           </a:p>
           <a:p>
             <a:pPr lvl="1"/>
             <a:r>
-              <a:rPr lang="en-US" smtClean="0"/>
+              <a:rPr lang="en-US"/>
               <a:t>Second level</a:t>
             </a:r>
           </a:p>
           <a:p>
             <a:pPr lvl="2"/>
             <a:r>
-              <a:rPr lang="en-US" smtClean="0"/>
+              <a:rPr lang="en-US"/>
               <a:t>Third level</a:t>
             </a:r>
           </a:p>
           <a:p>
             <a:pPr lvl="3"/>
             <a:r>
-              <a:rPr lang="en-US" smtClean="0"/>
+              <a:rPr lang="en-US"/>
               <a:t>Fourth level</a:t>
             </a:r>
           </a:p>
           <a:p>
             <a:pPr lvl="4"/>
             <a:r>
-              <a:rPr lang="en-US" smtClean="0"/>
+              <a:rPr lang="en-US"/>
               <a:t>Fifth level</a:t>
             </a:r>
             <a:endParaRPr lang="en-US" dirty="0"/>
@@ -3829,15 +3835,15 @@
           <a:lstStyle/>
           <a:p>
             <a:r>
-              <a:rPr lang="en-US" dirty="0" err="1" smtClean="0"/>
+              <a:rPr lang="en-US" dirty="0" err="1"/>
               <a:t>Atmoszféra</a:t>
             </a:r>
             <a:r>
-              <a:rPr lang="en-US" dirty="0" smtClean="0"/>
-              <a:t> </a:t>
-            </a:r>
-            <a:r>
-              <a:rPr lang="en-US" dirty="0" err="1" smtClean="0"/>
+              <a:rPr lang="en-US" dirty="0"/>
+              <a:t> </a:t>
+            </a:r>
+            <a:r>
+              <a:rPr lang="en-US" dirty="0" err="1"/>
               <a:t>szimuláció</a:t>
             </a:r>
             <a:endParaRPr lang="en-US" dirty="0"/>
@@ -3860,29 +3866,29 @@
           <a:lstStyle/>
           <a:p>
             <a:r>
-              <a:rPr lang="en-US" dirty="0" smtClean="0"/>
+              <a:rPr lang="en-US" dirty="0"/>
               <a:t>Simon </a:t>
             </a:r>
             <a:r>
-              <a:rPr lang="en-US" dirty="0" err="1" smtClean="0"/>
+              <a:rPr lang="en-US" dirty="0" err="1"/>
               <a:t>Zoltán</a:t>
             </a:r>
             <a:r>
-              <a:rPr lang="en-US" dirty="0" smtClean="0"/>
-              <a:t> </a:t>
-            </a:r>
-          </a:p>
-          <a:p>
-            <a:r>
-              <a:rPr lang="en-US" dirty="0" err="1" smtClean="0"/>
+              <a:rPr lang="en-US" dirty="0"/>
+              <a:t> </a:t>
+            </a:r>
+          </a:p>
+          <a:p>
+            <a:r>
+              <a:rPr lang="en-US" dirty="0" err="1"/>
               <a:t>Mohácsi</a:t>
             </a:r>
             <a:r>
-              <a:rPr lang="en-US" dirty="0" smtClean="0"/>
-              <a:t> </a:t>
-            </a:r>
-            <a:r>
-              <a:rPr lang="en-US" dirty="0" err="1" smtClean="0"/>
+              <a:rPr lang="en-US" dirty="0"/>
+              <a:t> </a:t>
+            </a:r>
+            <a:r>
+              <a:rPr lang="en-US" dirty="0" err="1"/>
               <a:t>Márton</a:t>
             </a:r>
             <a:endParaRPr lang="en-US" dirty="0"/>
@@ -3935,11 +3941,11 @@
           <a:lstStyle/>
           <a:p>
             <a:r>
-              <a:rPr lang="en-US" dirty="0" smtClean="0"/>
+              <a:rPr lang="en-US" dirty="0"/>
               <a:t>A HDR </a:t>
             </a:r>
             <a:r>
-              <a:rPr lang="en-US" dirty="0" err="1" smtClean="0"/>
+              <a:rPr lang="en-US" dirty="0" err="1"/>
               <a:t>hatása</a:t>
             </a:r>
             <a:endParaRPr lang="en-US" dirty="0"/>
@@ -3961,169 +3967,174 @@
           <a:bodyPr/>
           <a:lstStyle/>
           <a:p>
-            <a:r>
-              <a:rPr lang="en-US" dirty="0" err="1" smtClean="0"/>
+            <a:pPr algn="just"/>
+            <a:r>
+              <a:rPr lang="en-US" dirty="0" err="1"/>
               <a:t>Amikor</a:t>
             </a:r>
             <a:r>
-              <a:rPr lang="en-US" dirty="0" smtClean="0"/>
+              <a:rPr lang="en-US" dirty="0"/>
               <a:t> a </a:t>
             </a:r>
             <a:r>
-              <a:rPr lang="en-US" dirty="0" err="1" smtClean="0"/>
+              <a:rPr lang="en-US" dirty="0" err="1"/>
               <a:t>korábbi</a:t>
             </a:r>
             <a:r>
-              <a:rPr lang="en-US" dirty="0" smtClean="0"/>
-              <a:t> </a:t>
-            </a:r>
-            <a:r>
-              <a:rPr lang="en-US" dirty="0" err="1" smtClean="0"/>
+              <a:rPr lang="en-US" dirty="0"/>
+              <a:t> </a:t>
+            </a:r>
+            <a:r>
+              <a:rPr lang="en-US" dirty="0" err="1"/>
               <a:t>módszerrel</a:t>
             </a:r>
             <a:r>
-              <a:rPr lang="en-US" dirty="0" smtClean="0"/>
-              <a:t> </a:t>
-            </a:r>
-            <a:r>
-              <a:rPr lang="en-US" dirty="0" err="1" smtClean="0"/>
+              <a:rPr lang="en-US" dirty="0"/>
+              <a:t> </a:t>
+            </a:r>
+            <a:r>
+              <a:rPr lang="en-US" dirty="0" err="1"/>
               <a:t>fényt</a:t>
             </a:r>
             <a:r>
-              <a:rPr lang="en-US" dirty="0" smtClean="0"/>
-              <a:t> </a:t>
-            </a:r>
-            <a:r>
-              <a:rPr lang="en-US" dirty="0" err="1" smtClean="0"/>
+              <a:rPr lang="en-US" dirty="0"/>
+              <a:t> </a:t>
+            </a:r>
+            <a:r>
+              <a:rPr lang="en-US" dirty="0" err="1"/>
               <a:t>számítunk</a:t>
             </a:r>
             <a:r>
-              <a:rPr lang="en-US" dirty="0" smtClean="0"/>
+              <a:rPr lang="en-US" dirty="0"/>
               <a:t>, </a:t>
             </a:r>
             <a:r>
-              <a:rPr lang="en-US" dirty="0" err="1" smtClean="0"/>
+              <a:rPr lang="en-US" dirty="0" err="1"/>
               <a:t>gyakran</a:t>
             </a:r>
             <a:r>
-              <a:rPr lang="en-US" dirty="0" smtClean="0"/>
-              <a:t> </a:t>
-            </a:r>
-            <a:r>
-              <a:rPr lang="en-US" dirty="0" err="1" smtClean="0"/>
+              <a:rPr lang="en-US" dirty="0"/>
+              <a:t> </a:t>
+            </a:r>
+            <a:r>
+              <a:rPr lang="en-US" dirty="0" err="1"/>
               <a:t>olyan</a:t>
             </a:r>
             <a:r>
-              <a:rPr lang="en-US" dirty="0" smtClean="0"/>
-              <a:t> </a:t>
-            </a:r>
-            <a:r>
-              <a:rPr lang="en-US" dirty="0" err="1" smtClean="0"/>
+              <a:rPr lang="en-US" dirty="0"/>
+              <a:t> </a:t>
+            </a:r>
+            <a:r>
+              <a:rPr lang="en-US" dirty="0" err="1"/>
               <a:t>értékeket</a:t>
             </a:r>
             <a:r>
-              <a:rPr lang="en-US" dirty="0" smtClean="0"/>
-              <a:t> </a:t>
-            </a:r>
-            <a:r>
-              <a:rPr lang="en-US" dirty="0" err="1" smtClean="0"/>
+              <a:rPr lang="en-US" dirty="0"/>
+              <a:t> </a:t>
+            </a:r>
+            <a:r>
+              <a:rPr lang="en-US" dirty="0" err="1"/>
               <a:t>kapunk</a:t>
             </a:r>
             <a:r>
-              <a:rPr lang="en-US" dirty="0" smtClean="0"/>
-              <a:t> </a:t>
-            </a:r>
-            <a:r>
-              <a:rPr lang="en-US" dirty="0" err="1" smtClean="0"/>
+              <a:rPr lang="hu-HU" dirty="0"/>
+              <a:t>,</a:t>
+            </a:r>
+            <a:r>
+              <a:rPr lang="en-US" dirty="0"/>
+              <a:t> </a:t>
+            </a:r>
+            <a:r>
+              <a:rPr lang="en-US" dirty="0" err="1"/>
               <a:t>melyek</a:t>
             </a:r>
             <a:r>
-              <a:rPr lang="en-US" dirty="0" smtClean="0"/>
-              <a:t> </a:t>
-            </a:r>
-            <a:r>
-              <a:rPr lang="en-US" dirty="0" err="1" smtClean="0"/>
+              <a:rPr lang="en-US" dirty="0"/>
+              <a:t> </a:t>
+            </a:r>
+            <a:r>
+              <a:rPr lang="en-US" dirty="0" err="1"/>
               <a:t>fényerőssége</a:t>
             </a:r>
             <a:r>
-              <a:rPr lang="en-US" dirty="0" smtClean="0"/>
+              <a:rPr lang="en-US" dirty="0"/>
               <a:t> (</a:t>
             </a:r>
             <a:r>
-              <a:rPr lang="en-US" dirty="0" err="1" smtClean="0"/>
+              <a:rPr lang="en-US" dirty="0" err="1"/>
               <a:t>legalább</a:t>
             </a:r>
             <a:r>
-              <a:rPr lang="en-US" dirty="0" smtClean="0"/>
-              <a:t> </a:t>
-            </a:r>
-            <a:r>
-              <a:rPr lang="en-US" dirty="0" err="1" smtClean="0"/>
+              <a:rPr lang="en-US" dirty="0"/>
+              <a:t> </a:t>
+            </a:r>
+            <a:r>
+              <a:rPr lang="en-US" dirty="0" err="1"/>
               <a:t>az</a:t>
             </a:r>
             <a:r>
-              <a:rPr lang="en-US" dirty="0" smtClean="0"/>
-              <a:t> </a:t>
-            </a:r>
-            <a:r>
-              <a:rPr lang="en-US" dirty="0" err="1" smtClean="0"/>
+              <a:rPr lang="en-US" dirty="0"/>
+              <a:t> </a:t>
+            </a:r>
+            <a:r>
+              <a:rPr lang="en-US" dirty="0" err="1"/>
               <a:t>egyik</a:t>
             </a:r>
             <a:r>
-              <a:rPr lang="en-US" dirty="0" smtClean="0"/>
-              <a:t> </a:t>
-            </a:r>
-            <a:r>
-              <a:rPr lang="en-US" dirty="0" err="1" smtClean="0"/>
+              <a:rPr lang="en-US" dirty="0"/>
+              <a:t> </a:t>
+            </a:r>
+            <a:r>
+              <a:rPr lang="en-US" dirty="0" err="1"/>
               <a:t>csatornán</a:t>
             </a:r>
             <a:r>
-              <a:rPr lang="en-US" dirty="0" smtClean="0"/>
+              <a:rPr lang="en-US" dirty="0"/>
               <a:t>) </a:t>
             </a:r>
             <a:r>
-              <a:rPr lang="en-US" dirty="0" err="1" smtClean="0"/>
+              <a:rPr lang="en-US" dirty="0" err="1"/>
               <a:t>nagyon</a:t>
             </a:r>
             <a:r>
-              <a:rPr lang="en-US" dirty="0" smtClean="0"/>
-              <a:t> </a:t>
-            </a:r>
-            <a:r>
-              <a:rPr lang="en-US" dirty="0" err="1" smtClean="0"/>
+              <a:rPr lang="en-US" dirty="0"/>
+              <a:t> </a:t>
+            </a:r>
+            <a:r>
+              <a:rPr lang="en-US" dirty="0" err="1"/>
               <a:t>nagy</a:t>
             </a:r>
             <a:r>
-              <a:rPr lang="en-US" dirty="0" smtClean="0"/>
+              <a:rPr lang="en-US" dirty="0"/>
               <a:t>. </a:t>
             </a:r>
           </a:p>
           <a:p>
-            <a:r>
-              <a:rPr lang="en-US" dirty="0" err="1" smtClean="0"/>
+            <a:pPr algn="just"/>
+            <a:r>
+              <a:rPr lang="en-US" dirty="0" err="1"/>
               <a:t>Ennek</a:t>
             </a:r>
             <a:r>
-              <a:rPr lang="en-US" dirty="0" smtClean="0"/>
-              <a:t> </a:t>
-            </a:r>
-            <a:r>
-              <a:rPr lang="en-US" dirty="0" err="1" smtClean="0"/>
+              <a:rPr lang="en-US" dirty="0"/>
+              <a:t> </a:t>
+            </a:r>
+            <a:r>
+              <a:rPr lang="en-US" dirty="0" err="1"/>
               <a:t>kiküszöbölésére</a:t>
             </a:r>
             <a:r>
-              <a:rPr lang="en-US" dirty="0" smtClean="0"/>
+              <a:rPr lang="en-US" dirty="0"/>
               <a:t> HDR-t </a:t>
             </a:r>
             <a:r>
-              <a:rPr lang="en-US" dirty="0" err="1" smtClean="0"/>
+              <a:rPr lang="en-US" dirty="0" err="1"/>
               <a:t>alkalmazunk</a:t>
             </a:r>
             <a:r>
-              <a:rPr lang="en-US" dirty="0" smtClean="0"/>
+              <a:rPr lang="en-US" dirty="0"/>
               <a:t>.</a:t>
             </a:r>
-            <a:endParaRPr lang="en-US" dirty="0"/>
           </a:p>
         </p:txBody>
       </p:sp>
@@ -4239,6 +4250,79 @@
 </p:sld>
 </file>
 
+<file path=ppt/slides/slide11.xml><?xml version="1.0" encoding="utf-8"?>
+<p:sld xmlns:a="http://schemas.openxmlformats.org/drawingml/2006/main" xmlns:r="http://schemas.openxmlformats.org/officeDocument/2006/relationships" xmlns:p="http://schemas.openxmlformats.org/presentationml/2006/main">
+  <p:cSld>
+    <p:spTree>
+      <p:nvGrpSpPr>
+        <p:cNvPr id="1" name=""/>
+        <p:cNvGrpSpPr/>
+        <p:nvPr/>
+      </p:nvGrpSpPr>
+      <p:grpSpPr>
+        <a:xfrm>
+          <a:off x="0" y="0"/>
+          <a:ext cx="0" cy="0"/>
+          <a:chOff x="0" y="0"/>
+          <a:chExt cx="0" cy="0"/>
+        </a:xfrm>
+      </p:grpSpPr>
+      <p:sp>
+        <p:nvSpPr>
+          <p:cNvPr id="3" name="TextBox 2">
+            <a:extLst>
+              <a:ext uri="{FF2B5EF4-FFF2-40B4-BE49-F238E27FC236}">
+                <a16:creationId xmlns:a16="http://schemas.microsoft.com/office/drawing/2014/main" id="{EFC7A0A0-C586-46ED-BFC4-89F4BFAA4795}"/>
+              </a:ext>
+            </a:extLst>
+          </p:cNvPr>
+          <p:cNvSpPr txBox="1"/>
+          <p:nvPr/>
+        </p:nvSpPr>
+        <p:spPr>
+          <a:xfrm>
+            <a:off x="3048000" y="3105835"/>
+            <a:ext cx="6096000" cy="830997"/>
+          </a:xfrm>
+          <a:prstGeom prst="rect">
+            <a:avLst/>
+          </a:prstGeom>
+          <a:noFill/>
+        </p:spPr>
+        <p:txBody>
+          <a:bodyPr wrap="square">
+            <a:spAutoFit/>
+          </a:bodyPr>
+          <a:lstStyle/>
+          <a:p>
+            <a:r>
+              <a:rPr lang="en-US" sz="4800" dirty="0"/>
+              <a:t>K</a:t>
+            </a:r>
+            <a:r>
+              <a:rPr lang="hu-HU" sz="4800" dirty="0" err="1"/>
+              <a:t>öszönjük</a:t>
+            </a:r>
+            <a:r>
+              <a:rPr lang="hu-HU" sz="4800" dirty="0"/>
+              <a:t> a figyelmet!</a:t>
+            </a:r>
+          </a:p>
+        </p:txBody>
+      </p:sp>
+    </p:spTree>
+    <p:extLst>
+      <p:ext uri="{BB962C8B-B14F-4D97-AF65-F5344CB8AC3E}">
+        <p14:creationId xmlns:p14="http://schemas.microsoft.com/office/powerpoint/2010/main" val="3847830488"/>
+      </p:ext>
+    </p:extLst>
+  </p:cSld>
+  <p:clrMapOvr>
+    <a:masterClrMapping/>
+  </p:clrMapOvr>
+</p:sld>
+</file>
+
 <file path=ppt/slides/slide2.xml><?xml version="1.0" encoding="utf-8"?>
 <p:sld xmlns:a="http://schemas.openxmlformats.org/drawingml/2006/main" xmlns:r="http://schemas.openxmlformats.org/officeDocument/2006/relationships" xmlns:p="http://schemas.openxmlformats.org/presentationml/2006/main">
   <p:cSld>
@@ -4272,19 +4356,19 @@
           <a:lstStyle/>
           <a:p>
             <a:r>
-              <a:rPr lang="en-US" dirty="0" smtClean="0"/>
+              <a:rPr lang="en-US" dirty="0"/>
               <a:t>A </a:t>
             </a:r>
             <a:r>
-              <a:rPr lang="en-US" dirty="0" err="1" smtClean="0"/>
+              <a:rPr lang="en-US" dirty="0" err="1"/>
               <a:t>feladat</a:t>
             </a:r>
             <a:r>
-              <a:rPr lang="en-US" dirty="0" smtClean="0"/>
-              <a:t> </a:t>
-            </a:r>
-            <a:r>
-              <a:rPr lang="en-US" dirty="0" err="1" smtClean="0"/>
+              <a:rPr lang="en-US" dirty="0"/>
+              <a:t> </a:t>
+            </a:r>
+            <a:r>
+              <a:rPr lang="en-US" dirty="0" err="1"/>
               <a:t>leírása</a:t>
             </a:r>
             <a:endParaRPr lang="en-US" dirty="0"/>
@@ -4301,13 +4385,19 @@
             <p:ph idx="1"/>
           </p:nvPr>
         </p:nvSpPr>
-        <p:spPr/>
+        <p:spPr>
+          <a:xfrm>
+            <a:off x="1097280" y="1845734"/>
+            <a:ext cx="10058400" cy="1583266"/>
+          </a:xfrm>
+        </p:spPr>
         <p:txBody>
           <a:bodyPr/>
           <a:lstStyle/>
           <a:p>
-            <a:r>
-              <a:rPr lang="en-US" dirty="0" err="1" smtClean="0"/>
+            <a:pPr algn="just"/>
+            <a:r>
+              <a:rPr lang="en-US" dirty="0" err="1"/>
               <a:t>Egy</a:t>
             </a:r>
             <a:r>
@@ -4315,143 +4405,151 @@
               <a:t> </a:t>
             </a:r>
             <a:r>
-              <a:rPr lang="en-US" dirty="0" err="1" smtClean="0"/>
+              <a:rPr lang="en-US" dirty="0" err="1"/>
               <a:t>bolygó</a:t>
             </a:r>
             <a:r>
-              <a:rPr lang="en-US" dirty="0" smtClean="0"/>
-              <a:t> </a:t>
-            </a:r>
-            <a:r>
-              <a:rPr lang="en-US" dirty="0" err="1" smtClean="0"/>
+              <a:rPr lang="en-US" dirty="0"/>
+              <a:t> </a:t>
+            </a:r>
+            <a:r>
+              <a:rPr lang="en-US" dirty="0" err="1"/>
               <a:t>atmoszférájának</a:t>
             </a:r>
             <a:r>
-              <a:rPr lang="en-US" dirty="0" smtClean="0"/>
-              <a:t> </a:t>
-            </a:r>
-            <a:r>
-              <a:rPr lang="en-US" dirty="0" err="1" smtClean="0"/>
+              <a:rPr lang="en-US" dirty="0"/>
+              <a:t> </a:t>
+            </a:r>
+            <a:r>
+              <a:rPr lang="en-US" dirty="0" err="1"/>
               <a:t>fizikai</a:t>
             </a:r>
             <a:r>
-              <a:rPr lang="en-US" dirty="0" smtClean="0"/>
-              <a:t> </a:t>
-            </a:r>
-            <a:r>
-              <a:rPr lang="en-US" dirty="0" err="1" smtClean="0"/>
+              <a:rPr lang="en-US" dirty="0"/>
+              <a:t> </a:t>
+            </a:r>
+            <a:r>
+              <a:rPr lang="en-US" dirty="0" err="1"/>
               <a:t>szimulálása</a:t>
             </a:r>
             <a:r>
-              <a:rPr lang="en-US" dirty="0" smtClean="0"/>
+              <a:rPr lang="en-US" dirty="0"/>
               <a:t>.</a:t>
             </a:r>
           </a:p>
           <a:p>
-            <a:r>
-              <a:rPr lang="en-US" dirty="0" err="1" smtClean="0"/>
+            <a:pPr algn="just"/>
+            <a:r>
+              <a:rPr lang="en-US" dirty="0" err="1"/>
               <a:t>Ehhez</a:t>
             </a:r>
             <a:r>
-              <a:rPr lang="en-US" dirty="0" smtClean="0"/>
+              <a:rPr lang="en-US" dirty="0"/>
               <a:t> a </a:t>
             </a:r>
             <a:r>
-              <a:rPr lang="en-US" dirty="0" err="1" smtClean="0"/>
+              <a:rPr lang="en-US" dirty="0" err="1"/>
               <a:t>napból</a:t>
             </a:r>
             <a:r>
-              <a:rPr lang="en-US" dirty="0" smtClean="0"/>
-              <a:t> </a:t>
-            </a:r>
-            <a:r>
-              <a:rPr lang="en-US" dirty="0" err="1" smtClean="0"/>
+              <a:rPr lang="en-US" dirty="0"/>
+              <a:t> </a:t>
+            </a:r>
+            <a:r>
+              <a:rPr lang="en-US" dirty="0" err="1"/>
               <a:t>jövő</a:t>
             </a:r>
             <a:r>
-              <a:rPr lang="en-US" dirty="0" smtClean="0"/>
-              <a:t> </a:t>
-            </a:r>
-            <a:r>
-              <a:rPr lang="en-US" dirty="0" err="1" smtClean="0"/>
+              <a:rPr lang="en-US" dirty="0"/>
+              <a:t> </a:t>
+            </a:r>
+            <a:r>
+              <a:rPr lang="en-US" dirty="0" err="1"/>
               <a:t>külömböző</a:t>
             </a:r>
             <a:r>
-              <a:rPr lang="en-US" dirty="0" smtClean="0"/>
-              <a:t> </a:t>
-            </a:r>
-            <a:r>
-              <a:rPr lang="en-US" dirty="0" err="1" smtClean="0"/>
+              <a:rPr lang="en-US" dirty="0"/>
+              <a:t> </a:t>
+            </a:r>
+            <a:r>
+              <a:rPr lang="en-US" dirty="0" err="1"/>
               <a:t>hollámhosszú</a:t>
             </a:r>
             <a:r>
-              <a:rPr lang="en-US" dirty="0" smtClean="0"/>
-              <a:t> </a:t>
-            </a:r>
-            <a:r>
-              <a:rPr lang="en-US" dirty="0" err="1" smtClean="0"/>
+              <a:rPr lang="en-US" dirty="0"/>
+              <a:t> </a:t>
+            </a:r>
+            <a:r>
+              <a:rPr lang="en-US" dirty="0" err="1"/>
               <a:t>fénysugarak</a:t>
             </a:r>
             <a:r>
-              <a:rPr lang="en-US" dirty="0" smtClean="0"/>
-              <a:t> </a:t>
-            </a:r>
-            <a:r>
-              <a:rPr lang="en-US" dirty="0" err="1" smtClean="0"/>
+              <a:rPr lang="en-US" dirty="0"/>
+              <a:t> </a:t>
+            </a:r>
+            <a:r>
+              <a:rPr lang="en-US" dirty="0" err="1"/>
               <a:t>és</a:t>
             </a:r>
             <a:r>
-              <a:rPr lang="en-US" dirty="0" smtClean="0"/>
+              <a:rPr lang="en-US" dirty="0"/>
               <a:t> a </a:t>
             </a:r>
             <a:r>
-              <a:rPr lang="en-US" dirty="0" err="1" smtClean="0"/>
+              <a:rPr lang="en-US" dirty="0" err="1"/>
               <a:t>légkörben</a:t>
             </a:r>
             <a:r>
-              <a:rPr lang="en-US" dirty="0" smtClean="0"/>
-              <a:t> </a:t>
-            </a:r>
-            <a:r>
-              <a:rPr lang="en-US" dirty="0" err="1" smtClean="0"/>
+              <a:rPr lang="en-US" dirty="0"/>
+              <a:t> </a:t>
+            </a:r>
+            <a:r>
+              <a:rPr lang="en-US" dirty="0" err="1"/>
               <a:t>található</a:t>
             </a:r>
             <a:r>
-              <a:rPr lang="en-US" dirty="0" smtClean="0"/>
-              <a:t> </a:t>
-            </a:r>
-            <a:r>
-              <a:rPr lang="en-US" dirty="0" err="1" smtClean="0"/>
+              <a:rPr lang="en-US" dirty="0"/>
+              <a:t> </a:t>
+            </a:r>
+            <a:r>
+              <a:rPr lang="en-US" dirty="0" err="1"/>
               <a:t>részecskék</a:t>
             </a:r>
             <a:r>
-              <a:rPr lang="en-US" dirty="0" smtClean="0"/>
-              <a:t> </a:t>
-            </a:r>
-            <a:r>
-              <a:rPr lang="en-US" dirty="0" err="1" smtClean="0"/>
+              <a:rPr lang="en-US" dirty="0"/>
+              <a:t> </a:t>
+            </a:r>
+            <a:r>
+              <a:rPr lang="en-US" dirty="0" err="1"/>
               <a:t>szóródását</a:t>
             </a:r>
             <a:r>
-              <a:rPr lang="en-US" dirty="0" smtClean="0"/>
-              <a:t> </a:t>
-            </a:r>
-            <a:r>
-              <a:rPr lang="en-US" dirty="0" err="1" smtClean="0"/>
+              <a:rPr lang="en-US" dirty="0"/>
+              <a:t> </a:t>
+            </a:r>
+            <a:r>
+              <a:rPr lang="en-US" dirty="0" err="1"/>
               <a:t>modelleztük</a:t>
             </a:r>
             <a:r>
-              <a:rPr lang="en-US" dirty="0" smtClean="0"/>
+              <a:rPr lang="en-US" dirty="0"/>
               <a:t>.</a:t>
             </a:r>
-            <a:endParaRPr lang="en-US" dirty="0"/>
           </a:p>
         </p:txBody>
       </p:sp>
       <p:pic>
         <p:nvPicPr>
-          <p:cNvPr id="6" name="Picture 5" descr="A picture containing night sky&#10;&#10;Description automatically generated"/>
-          <p:cNvPicPr/>
+          <p:cNvPr id="5" name="Picture 4" descr="A picture containing blur&#10;&#10;Description automatically generated">
+            <a:extLst>
+              <a:ext uri="{FF2B5EF4-FFF2-40B4-BE49-F238E27FC236}">
+                <a16:creationId xmlns:a16="http://schemas.microsoft.com/office/drawing/2014/main" id="{4BA4A74A-31A0-41C1-BA67-78B4D1ADB867}"/>
+              </a:ext>
+            </a:extLst>
+          </p:cNvPr>
+          <p:cNvPicPr>
+            <a:picLocks noChangeAspect="1"/>
+          </p:cNvPicPr>
           <p:nvPr/>
         </p:nvPicPr>
         <p:blipFill>
@@ -4462,23 +4560,90 @@
               </a:ext>
             </a:extLst>
           </a:blip>
-          <a:srcRect/>
           <a:stretch>
             <a:fillRect/>
           </a:stretch>
         </p:blipFill>
-        <p:spPr bwMode="auto">
+        <p:spPr>
           <a:xfrm>
-            <a:off x="8174188" y="3379218"/>
-            <a:ext cx="3736340" cy="2794635"/>
+            <a:off x="1097280" y="3707590"/>
+            <a:ext cx="3286197" cy="2466262"/>
           </a:xfrm>
           <a:prstGeom prst="rect">
             <a:avLst/>
           </a:prstGeom>
-          <a:noFill/>
-          <a:ln>
-            <a:noFill/>
-          </a:ln>
+        </p:spPr>
+      </p:pic>
+      <p:pic>
+        <p:nvPicPr>
+          <p:cNvPr id="8" name="Picture 7">
+            <a:extLst>
+              <a:ext uri="{FF2B5EF4-FFF2-40B4-BE49-F238E27FC236}">
+                <a16:creationId xmlns:a16="http://schemas.microsoft.com/office/drawing/2014/main" id="{9BBC98BF-9C06-4BC4-9453-F472433DC564}"/>
+              </a:ext>
+            </a:extLst>
+          </p:cNvPr>
+          <p:cNvPicPr>
+            <a:picLocks noChangeAspect="1"/>
+          </p:cNvPicPr>
+          <p:nvPr/>
+        </p:nvPicPr>
+        <p:blipFill>
+          <a:blip r:embed="rId3" cstate="print">
+            <a:extLst>
+              <a:ext uri="{28A0092B-C50C-407E-A947-70E740481C1C}">
+                <a14:useLocalDpi xmlns:a14="http://schemas.microsoft.com/office/drawing/2010/main" val="0"/>
+              </a:ext>
+            </a:extLst>
+          </a:blip>
+          <a:stretch>
+            <a:fillRect/>
+          </a:stretch>
+        </p:blipFill>
+        <p:spPr>
+          <a:xfrm>
+            <a:off x="7869482" y="3708400"/>
+            <a:ext cx="3286197" cy="2465452"/>
+          </a:xfrm>
+          <a:prstGeom prst="rect">
+            <a:avLst/>
+          </a:prstGeom>
+        </p:spPr>
+      </p:pic>
+      <p:pic>
+        <p:nvPicPr>
+          <p:cNvPr id="10" name="Picture 9" descr="A picture containing silhouette, night sky&#10;&#10;Description automatically generated">
+            <a:extLst>
+              <a:ext uri="{FF2B5EF4-FFF2-40B4-BE49-F238E27FC236}">
+                <a16:creationId xmlns:a16="http://schemas.microsoft.com/office/drawing/2014/main" id="{B4C61159-0443-4110-A0C6-8EC49295EC3F}"/>
+              </a:ext>
+            </a:extLst>
+          </p:cNvPr>
+          <p:cNvPicPr>
+            <a:picLocks noChangeAspect="1"/>
+          </p:cNvPicPr>
+          <p:nvPr/>
+        </p:nvPicPr>
+        <p:blipFill>
+          <a:blip r:embed="rId4" cstate="print">
+            <a:extLst>
+              <a:ext uri="{28A0092B-C50C-407E-A947-70E740481C1C}">
+                <a14:useLocalDpi xmlns:a14="http://schemas.microsoft.com/office/drawing/2010/main" val="0"/>
+              </a:ext>
+            </a:extLst>
+          </a:blip>
+          <a:stretch>
+            <a:fillRect/>
+          </a:stretch>
+        </p:blipFill>
+        <p:spPr>
+          <a:xfrm>
+            <a:off x="4452901" y="3707590"/>
+            <a:ext cx="3286197" cy="2450122"/>
+          </a:xfrm>
+          <a:prstGeom prst="rect">
+            <a:avLst/>
+          </a:prstGeom>
         </p:spPr>
       </p:pic>
     </p:spTree>
@@ -4527,11 +4692,11 @@
           <a:lstStyle/>
           <a:p>
             <a:r>
-              <a:rPr lang="en-US" dirty="0" smtClean="0"/>
+              <a:rPr lang="en-US" dirty="0"/>
               <a:t>Rayleigh </a:t>
             </a:r>
             <a:r>
-              <a:rPr lang="en-US" dirty="0" err="1" smtClean="0"/>
+              <a:rPr lang="en-US" dirty="0" err="1"/>
               <a:t>szóródás</a:t>
             </a:r>
             <a:endParaRPr lang="en-US" dirty="0"/>
@@ -4553,196 +4718,203 @@
           <a:bodyPr/>
           <a:lstStyle/>
           <a:p>
-            <a:r>
-              <a:rPr lang="en-US" dirty="0" smtClean="0"/>
+            <a:pPr algn="just"/>
+            <a:r>
+              <a:rPr lang="en-US" dirty="0"/>
               <a:t>Rayleigh </a:t>
             </a:r>
             <a:r>
-              <a:rPr lang="en-US" dirty="0" err="1" smtClean="0"/>
+              <a:rPr lang="en-US" dirty="0" err="1"/>
               <a:t>szóródás</a:t>
             </a:r>
             <a:r>
-              <a:rPr lang="en-US" dirty="0" smtClean="0"/>
-              <a:t> </a:t>
-            </a:r>
-            <a:r>
-              <a:rPr lang="en-US" dirty="0" err="1" smtClean="0"/>
+              <a:rPr lang="en-US" dirty="0"/>
+              <a:t> </a:t>
+            </a:r>
+            <a:r>
+              <a:rPr lang="en-US" dirty="0" err="1"/>
               <a:t>akkor</a:t>
             </a:r>
             <a:r>
-              <a:rPr lang="en-US" dirty="0" smtClean="0"/>
-              <a:t> </a:t>
-            </a:r>
-            <a:r>
-              <a:rPr lang="en-US" dirty="0" err="1" smtClean="0"/>
+              <a:rPr lang="en-US" dirty="0"/>
+              <a:t> </a:t>
+            </a:r>
+            <a:r>
+              <a:rPr lang="en-US" dirty="0" err="1"/>
               <a:t>történik</a:t>
             </a:r>
             <a:r>
-              <a:rPr lang="en-US" dirty="0" smtClean="0"/>
-              <a:t> </a:t>
-            </a:r>
-            <a:r>
-              <a:rPr lang="en-US" dirty="0" err="1" smtClean="0"/>
+              <a:rPr lang="hu-HU" dirty="0"/>
+              <a:t>,</a:t>
+            </a:r>
+            <a:r>
+              <a:rPr lang="en-US" dirty="0"/>
+              <a:t> </a:t>
+            </a:r>
+            <a:r>
+              <a:rPr lang="en-US" dirty="0" err="1"/>
               <a:t>amikor</a:t>
             </a:r>
             <a:r>
-              <a:rPr lang="en-US" dirty="0" smtClean="0"/>
+              <a:rPr lang="en-US" dirty="0"/>
               <a:t> a </a:t>
             </a:r>
             <a:r>
-              <a:rPr lang="en-US" dirty="0" err="1" smtClean="0"/>
+              <a:rPr lang="en-US" dirty="0" err="1"/>
               <a:t>hullámok</a:t>
             </a:r>
             <a:r>
-              <a:rPr lang="en-US" dirty="0" smtClean="0"/>
-              <a:t> </a:t>
-            </a:r>
-            <a:r>
-              <a:rPr lang="en-US" dirty="0" err="1" smtClean="0"/>
+              <a:rPr lang="en-US" dirty="0"/>
+              <a:t> </a:t>
+            </a:r>
+            <a:r>
+              <a:rPr lang="en-US" dirty="0" err="1"/>
               <a:t>apró</a:t>
             </a:r>
             <a:r>
-              <a:rPr lang="en-US" dirty="0" smtClean="0"/>
-              <a:t> </a:t>
-            </a:r>
-            <a:r>
-              <a:rPr lang="en-US" dirty="0" err="1" smtClean="0"/>
+              <a:rPr lang="en-US" dirty="0"/>
+              <a:t> </a:t>
+            </a:r>
+            <a:r>
+              <a:rPr lang="en-US" dirty="0" err="1"/>
               <a:t>méretű</a:t>
             </a:r>
             <a:r>
-              <a:rPr lang="en-US" dirty="0" smtClean="0"/>
+              <a:rPr lang="en-US" dirty="0"/>
               <a:t> (</a:t>
             </a:r>
             <a:r>
-              <a:rPr lang="en-US" dirty="0" err="1" smtClean="0"/>
+              <a:rPr lang="en-US" dirty="0" err="1"/>
               <a:t>molekula</a:t>
             </a:r>
             <a:r>
-              <a:rPr lang="en-US" dirty="0" smtClean="0"/>
-              <a:t> </a:t>
-            </a:r>
-            <a:r>
-              <a:rPr lang="en-US" dirty="0" err="1" smtClean="0"/>
+              <a:rPr lang="en-US" dirty="0"/>
+              <a:t> </a:t>
+            </a:r>
+            <a:r>
+              <a:rPr lang="en-US" dirty="0" err="1"/>
               <a:t>nagyságú</a:t>
             </a:r>
             <a:r>
-              <a:rPr lang="en-US" dirty="0" smtClean="0"/>
+              <a:rPr lang="en-US" dirty="0"/>
               <a:t>) </a:t>
             </a:r>
             <a:r>
-              <a:rPr lang="en-US" dirty="0" err="1" smtClean="0"/>
+              <a:rPr lang="en-US" dirty="0" err="1"/>
               <a:t>részecskékkel</a:t>
             </a:r>
             <a:r>
-              <a:rPr lang="en-US" dirty="0" smtClean="0"/>
-              <a:t> </a:t>
-            </a:r>
-            <a:r>
-              <a:rPr lang="en-US" dirty="0" err="1" smtClean="0"/>
+              <a:rPr lang="en-US" dirty="0"/>
+              <a:t> </a:t>
+            </a:r>
+            <a:r>
+              <a:rPr lang="en-US" dirty="0" err="1"/>
               <a:t>találkoznak</a:t>
             </a:r>
             <a:r>
-              <a:rPr lang="en-US" dirty="0" smtClean="0"/>
+              <a:rPr lang="en-US" dirty="0"/>
               <a:t>. </a:t>
             </a:r>
           </a:p>
           <a:p>
-            <a:r>
-              <a:rPr lang="en-US" dirty="0" smtClean="0"/>
+            <a:pPr algn="just"/>
+            <a:r>
+              <a:rPr lang="en-US" dirty="0"/>
               <a:t>A Rayleigh </a:t>
             </a:r>
             <a:r>
-              <a:rPr lang="en-US" dirty="0" err="1" smtClean="0"/>
+              <a:rPr lang="en-US" dirty="0" err="1"/>
               <a:t>szóródás</a:t>
             </a:r>
             <a:r>
-              <a:rPr lang="en-US" dirty="0" smtClean="0"/>
+              <a:rPr lang="en-US" dirty="0"/>
               <a:t> a </a:t>
             </a:r>
             <a:r>
-              <a:rPr lang="en-US" dirty="0" err="1" smtClean="0"/>
+              <a:rPr lang="en-US" dirty="0" err="1"/>
               <a:t>kisebb</a:t>
             </a:r>
             <a:r>
-              <a:rPr lang="en-US" dirty="0" smtClean="0"/>
-              <a:t> </a:t>
-            </a:r>
-            <a:r>
-              <a:rPr lang="en-US" dirty="0" err="1" smtClean="0"/>
+              <a:rPr lang="en-US" dirty="0"/>
+              <a:t> </a:t>
+            </a:r>
+            <a:r>
+              <a:rPr lang="en-US" dirty="0" err="1"/>
               <a:t>hullámhosszú</a:t>
             </a:r>
             <a:r>
-              <a:rPr lang="en-US" dirty="0" smtClean="0"/>
-              <a:t> </a:t>
-            </a:r>
-            <a:r>
-              <a:rPr lang="en-US" dirty="0" err="1" smtClean="0"/>
+              <a:rPr lang="en-US" dirty="0"/>
+              <a:t> </a:t>
+            </a:r>
+            <a:r>
+              <a:rPr lang="en-US" dirty="0" err="1"/>
               <a:t>fénysugarakat</a:t>
             </a:r>
             <a:r>
-              <a:rPr lang="en-US" dirty="0" smtClean="0"/>
-              <a:t> </a:t>
-            </a:r>
-            <a:r>
-              <a:rPr lang="en-US" dirty="0" err="1" smtClean="0"/>
+              <a:rPr lang="en-US" dirty="0"/>
+              <a:t> </a:t>
+            </a:r>
+            <a:r>
+              <a:rPr lang="en-US" dirty="0" err="1"/>
               <a:t>jobban</a:t>
             </a:r>
             <a:r>
-              <a:rPr lang="en-US" dirty="0" smtClean="0"/>
-              <a:t> </a:t>
-            </a:r>
-            <a:r>
-              <a:rPr lang="en-US" dirty="0" err="1" smtClean="0"/>
+              <a:rPr lang="en-US" dirty="0"/>
+              <a:t> </a:t>
+            </a:r>
+            <a:r>
+              <a:rPr lang="en-US" dirty="0" err="1"/>
               <a:t>affektálja</a:t>
             </a:r>
             <a:r>
-              <a:rPr lang="en-US" dirty="0" smtClean="0"/>
+              <a:rPr lang="en-US" dirty="0"/>
               <a:t>.</a:t>
             </a:r>
           </a:p>
           <a:p>
-            <a:r>
-              <a:rPr lang="en-US" dirty="0" err="1" smtClean="0"/>
+            <a:pPr algn="just"/>
+            <a:r>
+              <a:rPr lang="en-US" dirty="0" err="1"/>
               <a:t>Az</a:t>
             </a:r>
             <a:r>
-              <a:rPr lang="en-US" dirty="0" smtClean="0"/>
-              <a:t> </a:t>
-            </a:r>
-            <a:r>
-              <a:rPr lang="en-US" dirty="0" err="1" smtClean="0"/>
+              <a:rPr lang="en-US" dirty="0"/>
+              <a:t> </a:t>
+            </a:r>
+            <a:r>
+              <a:rPr lang="en-US" dirty="0" err="1"/>
               <a:t>ég</a:t>
             </a:r>
             <a:r>
-              <a:rPr lang="en-US" dirty="0" smtClean="0"/>
+              <a:rPr lang="en-US" dirty="0"/>
               <a:t> a Rayleigh </a:t>
             </a:r>
             <a:r>
-              <a:rPr lang="en-US" dirty="0" err="1" smtClean="0"/>
+              <a:rPr lang="en-US" dirty="0" err="1"/>
               <a:t>szóródás</a:t>
             </a:r>
             <a:r>
-              <a:rPr lang="en-US" dirty="0" smtClean="0"/>
-              <a:t> </a:t>
-            </a:r>
-            <a:r>
-              <a:rPr lang="en-US" dirty="0" err="1" smtClean="0"/>
+              <a:rPr lang="en-US" dirty="0"/>
+              <a:t> </a:t>
+            </a:r>
+            <a:r>
+              <a:rPr lang="en-US" dirty="0" err="1"/>
               <a:t>miatt</a:t>
             </a:r>
             <a:r>
-              <a:rPr lang="en-US" dirty="0" smtClean="0"/>
-              <a:t> </a:t>
-            </a:r>
-            <a:r>
-              <a:rPr lang="en-US" dirty="0" err="1" smtClean="0"/>
+              <a:rPr lang="en-US" dirty="0"/>
+              <a:t> </a:t>
+            </a:r>
+            <a:r>
+              <a:rPr lang="en-US" dirty="0" err="1"/>
               <a:t>látszódik</a:t>
             </a:r>
             <a:r>
-              <a:rPr lang="en-US" dirty="0" smtClean="0"/>
-              <a:t> </a:t>
-            </a:r>
-            <a:r>
-              <a:rPr lang="en-US" dirty="0" err="1" smtClean="0"/>
+              <a:rPr lang="en-US" dirty="0"/>
+              <a:t> </a:t>
+            </a:r>
+            <a:r>
+              <a:rPr lang="en-US" dirty="0" err="1"/>
               <a:t>kéknek</a:t>
             </a:r>
             <a:endParaRPr lang="en-US" dirty="0"/>
@@ -4851,11 +5023,11 @@
           <a:lstStyle/>
           <a:p>
             <a:r>
-              <a:rPr lang="en-US" dirty="0" smtClean="0"/>
+              <a:rPr lang="en-US" dirty="0"/>
               <a:t>Mie </a:t>
             </a:r>
             <a:r>
-              <a:rPr lang="en-US" dirty="0" err="1" smtClean="0"/>
+              <a:rPr lang="en-US" dirty="0" err="1"/>
               <a:t>szóródás</a:t>
             </a:r>
             <a:endParaRPr lang="en-US" dirty="0"/>
@@ -4872,245 +5044,252 @@
             <p:ph idx="1"/>
           </p:nvPr>
         </p:nvSpPr>
-        <p:spPr/>
+        <p:spPr>
+          <a:xfrm>
+            <a:off x="1097280" y="1845734"/>
+            <a:ext cx="10058400" cy="2317625"/>
+          </a:xfrm>
+        </p:spPr>
         <p:txBody>
           <a:bodyPr/>
           <a:lstStyle/>
           <a:p>
-            <a:r>
-              <a:rPr lang="en-US" dirty="0" smtClean="0"/>
+            <a:pPr algn="just"/>
+            <a:r>
+              <a:rPr lang="en-US" dirty="0"/>
               <a:t>A Mie </a:t>
             </a:r>
             <a:r>
-              <a:rPr lang="en-US" dirty="0" err="1" smtClean="0"/>
+              <a:rPr lang="en-US" dirty="0" err="1"/>
               <a:t>szóródás</a:t>
             </a:r>
             <a:r>
-              <a:rPr lang="en-US" dirty="0" smtClean="0"/>
-              <a:t> </a:t>
-            </a:r>
-            <a:r>
-              <a:rPr lang="en-US" dirty="0" err="1" smtClean="0"/>
+              <a:rPr lang="en-US" dirty="0"/>
+              <a:t> </a:t>
+            </a:r>
+            <a:r>
+              <a:rPr lang="en-US" dirty="0" err="1"/>
               <a:t>akkor</a:t>
             </a:r>
             <a:r>
-              <a:rPr lang="en-US" dirty="0" smtClean="0"/>
-              <a:t> </a:t>
-            </a:r>
-            <a:r>
-              <a:rPr lang="en-US" dirty="0" err="1" smtClean="0"/>
+              <a:rPr lang="en-US" dirty="0"/>
+              <a:t> </a:t>
+            </a:r>
+            <a:r>
+              <a:rPr lang="en-US" dirty="0" err="1"/>
               <a:t>történik</a:t>
             </a:r>
             <a:r>
-              <a:rPr lang="en-US" dirty="0" smtClean="0"/>
-              <a:t> </a:t>
-            </a:r>
-            <a:r>
-              <a:rPr lang="en-US" dirty="0" err="1" smtClean="0"/>
+              <a:rPr lang="en-US" dirty="0"/>
+              <a:t> </a:t>
+            </a:r>
+            <a:r>
+              <a:rPr lang="en-US" dirty="0" err="1"/>
               <a:t>amikor</a:t>
             </a:r>
             <a:r>
-              <a:rPr lang="en-US" dirty="0" smtClean="0"/>
+              <a:rPr lang="en-US" dirty="0"/>
               <a:t> a </a:t>
             </a:r>
             <a:r>
-              <a:rPr lang="en-US" dirty="0" err="1" smtClean="0"/>
+              <a:rPr lang="en-US" dirty="0" err="1"/>
               <a:t>hullámok</a:t>
             </a:r>
             <a:r>
-              <a:rPr lang="en-US" dirty="0" smtClean="0"/>
-              <a:t> </a:t>
-            </a:r>
-            <a:r>
-              <a:rPr lang="en-US" dirty="0" err="1" smtClean="0"/>
+              <a:rPr lang="en-US" dirty="0"/>
+              <a:t> </a:t>
+            </a:r>
+            <a:r>
+              <a:rPr lang="en-US" dirty="0" err="1"/>
               <a:t>nagy</a:t>
             </a:r>
             <a:r>
-              <a:rPr lang="en-US" dirty="0" smtClean="0"/>
-              <a:t> </a:t>
-            </a:r>
-            <a:r>
-              <a:rPr lang="en-US" dirty="0" err="1" smtClean="0"/>
+              <a:rPr lang="en-US" dirty="0"/>
+              <a:t> </a:t>
+            </a:r>
+            <a:r>
+              <a:rPr lang="en-US" dirty="0" err="1"/>
               <a:t>méretű</a:t>
             </a:r>
             <a:r>
-              <a:rPr lang="en-US" dirty="0" smtClean="0"/>
+              <a:rPr lang="en-US" dirty="0"/>
               <a:t> (</a:t>
             </a:r>
             <a:r>
-              <a:rPr lang="en-US" dirty="0" err="1" smtClean="0"/>
+              <a:rPr lang="en-US" dirty="0" err="1"/>
               <a:t>porszem</a:t>
             </a:r>
             <a:r>
-              <a:rPr lang="en-US" dirty="0" smtClean="0"/>
+              <a:rPr lang="en-US" dirty="0"/>
               <a:t>/</a:t>
             </a:r>
             <a:r>
-              <a:rPr lang="en-US" dirty="0" err="1" smtClean="0"/>
+              <a:rPr lang="en-US" dirty="0" err="1"/>
               <a:t>vízcsepp</a:t>
             </a:r>
             <a:r>
-              <a:rPr lang="en-US" dirty="0" smtClean="0"/>
-              <a:t> </a:t>
-            </a:r>
-            <a:r>
-              <a:rPr lang="en-US" dirty="0" err="1" smtClean="0"/>
+              <a:rPr lang="en-US" dirty="0"/>
+              <a:t> </a:t>
+            </a:r>
+            <a:r>
+              <a:rPr lang="en-US" dirty="0" err="1"/>
               <a:t>nagyságú</a:t>
             </a:r>
             <a:r>
-              <a:rPr lang="en-US" dirty="0" smtClean="0"/>
+              <a:rPr lang="en-US" dirty="0"/>
               <a:t>) </a:t>
             </a:r>
             <a:r>
-              <a:rPr lang="en-US" dirty="0" err="1" smtClean="0"/>
+              <a:rPr lang="en-US" dirty="0" err="1"/>
               <a:t>részecskékkel</a:t>
             </a:r>
             <a:r>
-              <a:rPr lang="en-US" dirty="0" smtClean="0"/>
-              <a:t> </a:t>
-            </a:r>
-            <a:r>
-              <a:rPr lang="en-US" dirty="0" err="1" smtClean="0"/>
+              <a:rPr lang="en-US" dirty="0"/>
+              <a:t> </a:t>
+            </a:r>
+            <a:r>
+              <a:rPr lang="en-US" dirty="0" err="1"/>
               <a:t>találkoznak</a:t>
             </a:r>
-            <a:endParaRPr lang="en-US" dirty="0" smtClean="0"/>
-          </a:p>
-          <a:p>
-            <a:r>
-              <a:rPr lang="en-US" dirty="0" smtClean="0"/>
+            <a:endParaRPr lang="en-US" dirty="0"/>
+          </a:p>
+          <a:p>
+            <a:pPr algn="just"/>
+            <a:r>
+              <a:rPr lang="en-US" dirty="0"/>
               <a:t>A Mie </a:t>
             </a:r>
             <a:r>
-              <a:rPr lang="en-US" dirty="0" err="1" smtClean="0"/>
+              <a:rPr lang="en-US" dirty="0" err="1"/>
               <a:t>szóródás</a:t>
             </a:r>
             <a:r>
-              <a:rPr lang="en-US" dirty="0" smtClean="0"/>
-              <a:t> </a:t>
-            </a:r>
-            <a:r>
-              <a:rPr lang="en-US" dirty="0" err="1" smtClean="0"/>
+              <a:rPr lang="en-US" dirty="0"/>
+              <a:t> </a:t>
+            </a:r>
+            <a:r>
+              <a:rPr lang="en-US" dirty="0" err="1"/>
               <a:t>minden</a:t>
             </a:r>
             <a:r>
-              <a:rPr lang="en-US" dirty="0" smtClean="0"/>
-              <a:t> </a:t>
-            </a:r>
-            <a:r>
-              <a:rPr lang="en-US" dirty="0" err="1" smtClean="0"/>
+              <a:rPr lang="en-US" dirty="0"/>
+              <a:t> </a:t>
+            </a:r>
+            <a:r>
+              <a:rPr lang="en-US" dirty="0" err="1"/>
               <a:t>fénysugarat</a:t>
             </a:r>
             <a:r>
-              <a:rPr lang="en-US" dirty="0" smtClean="0"/>
-              <a:t> </a:t>
-            </a:r>
-            <a:r>
-              <a:rPr lang="en-US" dirty="0" err="1" smtClean="0"/>
+              <a:rPr lang="en-US" dirty="0"/>
+              <a:t> </a:t>
+            </a:r>
+            <a:r>
+              <a:rPr lang="en-US" dirty="0" err="1"/>
               <a:t>nagyjából</a:t>
             </a:r>
             <a:r>
-              <a:rPr lang="en-US" dirty="0" smtClean="0"/>
-              <a:t> </a:t>
-            </a:r>
-            <a:r>
-              <a:rPr lang="en-US" dirty="0" err="1" smtClean="0"/>
+              <a:rPr lang="en-US" dirty="0"/>
+              <a:t> </a:t>
+            </a:r>
+            <a:r>
+              <a:rPr lang="en-US" dirty="0" err="1"/>
               <a:t>azonos</a:t>
             </a:r>
             <a:r>
-              <a:rPr lang="en-US" dirty="0" smtClean="0"/>
-              <a:t> </a:t>
-            </a:r>
-            <a:r>
-              <a:rPr lang="en-US" dirty="0" err="1" smtClean="0"/>
+              <a:rPr lang="en-US" dirty="0"/>
+              <a:t> </a:t>
+            </a:r>
+            <a:r>
+              <a:rPr lang="en-US" dirty="0" err="1"/>
               <a:t>mértékben</a:t>
             </a:r>
             <a:r>
-              <a:rPr lang="en-US" dirty="0" smtClean="0"/>
-              <a:t> </a:t>
-            </a:r>
-            <a:r>
-              <a:rPr lang="en-US" dirty="0" err="1" smtClean="0"/>
-              <a:t>befolyásolja</a:t>
-            </a:r>
-            <a:r>
-              <a:rPr lang="en-US" dirty="0" smtClean="0"/>
+              <a:rPr lang="en-US" dirty="0"/>
+              <a:t> </a:t>
+            </a:r>
+            <a:r>
+              <a:rPr lang="en-US" dirty="0" err="1"/>
+              <a:t>befolyásol</a:t>
+            </a:r>
+            <a:r>
+              <a:rPr lang="en-US" dirty="0"/>
               <a:t>. </a:t>
             </a:r>
           </a:p>
           <a:p>
-            <a:r>
-              <a:rPr lang="en-US" dirty="0" err="1" smtClean="0"/>
+            <a:pPr algn="just"/>
+            <a:r>
+              <a:rPr lang="en-US" dirty="0" err="1"/>
               <a:t>Emiatt</a:t>
             </a:r>
             <a:r>
-              <a:rPr lang="en-US" dirty="0" smtClean="0"/>
+              <a:rPr lang="en-US" dirty="0"/>
               <a:t> a </a:t>
             </a:r>
             <a:r>
-              <a:rPr lang="en-US" dirty="0" err="1" smtClean="0"/>
+              <a:rPr lang="en-US" dirty="0" err="1"/>
               <a:t>szóródás</a:t>
             </a:r>
             <a:r>
-              <a:rPr lang="en-US" dirty="0" smtClean="0"/>
-              <a:t> </a:t>
-            </a:r>
-            <a:r>
-              <a:rPr lang="en-US" dirty="0" err="1" smtClean="0"/>
+              <a:rPr lang="en-US" dirty="0"/>
+              <a:t> </a:t>
+            </a:r>
+            <a:r>
+              <a:rPr lang="en-US" dirty="0" err="1"/>
               <a:t>miatt</a:t>
             </a:r>
             <a:r>
-              <a:rPr lang="en-US" dirty="0" smtClean="0"/>
-              <a:t> </a:t>
-            </a:r>
-            <a:r>
-              <a:rPr lang="en-US" dirty="0" err="1" smtClean="0"/>
+              <a:rPr lang="en-US" dirty="0"/>
+              <a:t> </a:t>
+            </a:r>
+            <a:r>
+              <a:rPr lang="en-US" dirty="0" err="1"/>
               <a:t>az</a:t>
             </a:r>
             <a:r>
-              <a:rPr lang="en-US" dirty="0" smtClean="0"/>
-              <a:t> </a:t>
-            </a:r>
-            <a:r>
-              <a:rPr lang="en-US" dirty="0" err="1" smtClean="0"/>
+              <a:rPr lang="en-US" dirty="0"/>
+              <a:t> </a:t>
+            </a:r>
+            <a:r>
+              <a:rPr lang="en-US" dirty="0" err="1"/>
               <a:t>ég</a:t>
             </a:r>
             <a:r>
-              <a:rPr lang="en-US" dirty="0" smtClean="0"/>
-              <a:t> </a:t>
-            </a:r>
-            <a:r>
-              <a:rPr lang="en-US" dirty="0" err="1" smtClean="0"/>
+              <a:rPr lang="en-US" dirty="0"/>
+              <a:t> </a:t>
+            </a:r>
+            <a:r>
+              <a:rPr lang="en-US" dirty="0" err="1"/>
               <a:t>egy</a:t>
             </a:r>
             <a:r>
-              <a:rPr lang="en-US" dirty="0" smtClean="0"/>
-              <a:t> </a:t>
-            </a:r>
-            <a:r>
-              <a:rPr lang="en-US" dirty="0" err="1" smtClean="0"/>
+              <a:rPr lang="en-US" dirty="0"/>
+              <a:t> </a:t>
+            </a:r>
+            <a:r>
+              <a:rPr lang="en-US" dirty="0" err="1"/>
               <a:t>kicsit</a:t>
             </a:r>
             <a:r>
-              <a:rPr lang="en-US" dirty="0" smtClean="0"/>
-              <a:t> </a:t>
-            </a:r>
-            <a:r>
-              <a:rPr lang="en-US" dirty="0" err="1" smtClean="0"/>
+              <a:rPr lang="en-US" dirty="0"/>
+              <a:t> </a:t>
+            </a:r>
+            <a:r>
+              <a:rPr lang="en-US" dirty="0" err="1"/>
               <a:t>szürkébbnek</a:t>
             </a:r>
             <a:r>
-              <a:rPr lang="en-US" dirty="0" smtClean="0"/>
-              <a:t> </a:t>
-            </a:r>
-            <a:r>
-              <a:rPr lang="en-US" dirty="0" err="1" smtClean="0"/>
+              <a:rPr lang="en-US" dirty="0"/>
+              <a:t> </a:t>
+            </a:r>
+            <a:r>
+              <a:rPr lang="en-US" dirty="0" err="1"/>
               <a:t>látszódik</a:t>
             </a:r>
             <a:r>
-              <a:rPr lang="en-US" dirty="0" smtClean="0"/>
+              <a:rPr lang="en-US" dirty="0"/>
               <a:t>.</a:t>
             </a:r>
-            <a:endParaRPr lang="en-US" dirty="0"/>
           </a:p>
         </p:txBody>
       </p:sp>
@@ -5216,231 +5395,300 @@
           <a:lstStyle/>
           <a:p>
             <a:r>
-              <a:rPr lang="en-US" dirty="0" err="1" smtClean="0"/>
+              <a:rPr lang="en-US" dirty="0" err="1"/>
               <a:t>Fázis</a:t>
             </a:r>
             <a:r>
-              <a:rPr lang="en-US" dirty="0" smtClean="0"/>
-              <a:t> </a:t>
-            </a:r>
-            <a:r>
-              <a:rPr lang="en-US" dirty="0" err="1" smtClean="0"/>
+              <a:rPr lang="en-US" dirty="0"/>
+              <a:t> </a:t>
+            </a:r>
+            <a:r>
+              <a:rPr lang="en-US" dirty="0" err="1"/>
               <a:t>funkció</a:t>
             </a:r>
             <a:endParaRPr lang="en-US" dirty="0"/>
           </a:p>
         </p:txBody>
       </p:sp>
-      <p:sp>
-        <p:nvSpPr>
-          <p:cNvPr id="3" name="Content Placeholder 2"/>
-          <p:cNvSpPr>
-            <a:spLocks noGrp="1"/>
-          </p:cNvSpPr>
-          <p:nvPr>
-            <p:ph idx="1"/>
-          </p:nvPr>
-        </p:nvSpPr>
-        <p:spPr/>
-        <p:txBody>
-          <a:bodyPr/>
-          <a:lstStyle/>
-          <a:p>
-            <a:r>
-              <a:rPr lang="en-US" dirty="0" smtClean="0"/>
-              <a:t>A </a:t>
-            </a:r>
-            <a:r>
-              <a:rPr lang="en-US" dirty="0" err="1" smtClean="0"/>
-              <a:t>fázis</a:t>
-            </a:r>
-            <a:r>
-              <a:rPr lang="en-US" dirty="0" smtClean="0"/>
-              <a:t> </a:t>
-            </a:r>
-            <a:r>
-              <a:rPr lang="en-US" dirty="0" err="1" smtClean="0"/>
-              <a:t>funkció</a:t>
-            </a:r>
-            <a:r>
-              <a:rPr lang="en-US" dirty="0" smtClean="0"/>
-              <a:t> </a:t>
-            </a:r>
-            <a:r>
-              <a:rPr lang="en-US" dirty="0" err="1" smtClean="0"/>
-              <a:t>megmondja</a:t>
-            </a:r>
-            <a:r>
-              <a:rPr lang="en-US" dirty="0" smtClean="0"/>
-              <a:t>, </a:t>
-            </a:r>
-            <a:r>
-              <a:rPr lang="en-US" dirty="0" err="1" smtClean="0"/>
-              <a:t>hogy</a:t>
-            </a:r>
-            <a:r>
-              <a:rPr lang="en-US" dirty="0" smtClean="0"/>
-              <a:t> </a:t>
-            </a:r>
-            <a:r>
-              <a:rPr lang="en-US" dirty="0" err="1" smtClean="0"/>
-              <a:t>egy</a:t>
-            </a:r>
-            <a:r>
-              <a:rPr lang="en-US" dirty="0" smtClean="0"/>
-              <a:t> </a:t>
-            </a:r>
-            <a:r>
-              <a:rPr lang="en-US" dirty="0" err="1" smtClean="0"/>
-              <a:t>adott</a:t>
-            </a:r>
-            <a:r>
-              <a:rPr lang="en-US" dirty="0" smtClean="0"/>
-              <a:t> </a:t>
-            </a:r>
-            <a:r>
-              <a:rPr lang="en-US" dirty="0" err="1" smtClean="0"/>
-              <a:t>pontból</a:t>
-            </a:r>
-            <a:r>
-              <a:rPr lang="en-US" dirty="0" smtClean="0"/>
-              <a:t> </a:t>
-            </a:r>
-            <a:r>
-              <a:rPr lang="en-US" dirty="0" err="1" smtClean="0"/>
-              <a:t>mennyi</a:t>
-            </a:r>
-            <a:r>
-              <a:rPr lang="en-US" dirty="0" smtClean="0"/>
-              <a:t> </a:t>
-            </a:r>
-            <a:r>
-              <a:rPr lang="en-US" dirty="0" err="1" smtClean="0"/>
-              <a:t>fény</a:t>
-            </a:r>
-            <a:r>
-              <a:rPr lang="en-US" dirty="0" smtClean="0"/>
-              <a:t> jut el a </a:t>
-            </a:r>
-            <a:r>
-              <a:rPr lang="en-US" dirty="0" err="1" smtClean="0"/>
-              <a:t>szemünkbe</a:t>
-            </a:r>
-            <a:r>
-              <a:rPr lang="en-US" dirty="0" smtClean="0"/>
-              <a:t>.</a:t>
-            </a:r>
-          </a:p>
-          <a:p>
-            <a:r>
-              <a:rPr lang="en-US" dirty="0" smtClean="0"/>
-              <a:t>Theta a </a:t>
-            </a:r>
-            <a:r>
-              <a:rPr lang="en-US" dirty="0" err="1" smtClean="0"/>
-              <a:t>szemünkből</a:t>
-            </a:r>
-            <a:r>
-              <a:rPr lang="en-US" dirty="0" smtClean="0"/>
-              <a:t> </a:t>
-            </a:r>
-            <a:r>
-              <a:rPr lang="en-US" dirty="0" err="1" smtClean="0"/>
-              <a:t>egyenesen</a:t>
-            </a:r>
-            <a:r>
-              <a:rPr lang="en-US" dirty="0" smtClean="0"/>
-              <a:t> </a:t>
-            </a:r>
-            <a:r>
-              <a:rPr lang="en-US" dirty="0" err="1" smtClean="0"/>
-              <a:t>mutató</a:t>
-            </a:r>
-            <a:r>
-              <a:rPr lang="en-US" dirty="0" smtClean="0"/>
-              <a:t> </a:t>
-            </a:r>
-            <a:r>
-              <a:rPr lang="en-US" dirty="0" err="1" smtClean="0"/>
-              <a:t>vektor</a:t>
-            </a:r>
-            <a:r>
-              <a:rPr lang="en-US" dirty="0" smtClean="0"/>
-              <a:t> s a nap </a:t>
-            </a:r>
-            <a:r>
-              <a:rPr lang="en-US" dirty="0" err="1" smtClean="0"/>
-              <a:t>felé</a:t>
-            </a:r>
-            <a:r>
-              <a:rPr lang="en-US" dirty="0" smtClean="0"/>
-              <a:t> </a:t>
-            </a:r>
-            <a:r>
-              <a:rPr lang="en-US" dirty="0" err="1" smtClean="0"/>
-              <a:t>mutató</a:t>
-            </a:r>
-            <a:r>
-              <a:rPr lang="en-US" dirty="0" smtClean="0"/>
-              <a:t> </a:t>
-            </a:r>
-            <a:r>
-              <a:rPr lang="en-US" dirty="0" err="1" smtClean="0"/>
-              <a:t>vektor</a:t>
-            </a:r>
-            <a:r>
-              <a:rPr lang="en-US" dirty="0" smtClean="0"/>
-              <a:t> </a:t>
-            </a:r>
-            <a:r>
-              <a:rPr lang="en-US" dirty="0" err="1" smtClean="0"/>
-              <a:t>bezárt</a:t>
-            </a:r>
-            <a:r>
-              <a:rPr lang="en-US" dirty="0" smtClean="0"/>
-              <a:t> </a:t>
-            </a:r>
-            <a:r>
-              <a:rPr lang="en-US" dirty="0" err="1" smtClean="0"/>
-              <a:t>szöge</a:t>
-            </a:r>
-            <a:r>
-              <a:rPr lang="en-US" dirty="0" smtClean="0"/>
-              <a:t>.</a:t>
-            </a:r>
-          </a:p>
-          <a:p>
-            <a:r>
-              <a:rPr lang="en-US" dirty="0" smtClean="0"/>
-              <a:t>A g a </a:t>
-            </a:r>
-            <a:r>
-              <a:rPr lang="en-US" dirty="0" err="1" smtClean="0"/>
-              <a:t>szóródás</a:t>
-            </a:r>
-            <a:r>
-              <a:rPr lang="en-US" dirty="0" smtClean="0"/>
-              <a:t> </a:t>
-            </a:r>
-            <a:r>
-              <a:rPr lang="en-US" dirty="0" err="1" smtClean="0"/>
-              <a:t>szimmetriáját</a:t>
-            </a:r>
-            <a:r>
-              <a:rPr lang="en-US" dirty="0" smtClean="0"/>
-              <a:t> </a:t>
-            </a:r>
-            <a:r>
-              <a:rPr lang="en-US" dirty="0" err="1" smtClean="0"/>
-              <a:t>kontrollálja</a:t>
-            </a:r>
-            <a:endParaRPr lang="en-US" dirty="0" smtClean="0"/>
-          </a:p>
-          <a:p>
-            <a:endParaRPr lang="en-US" dirty="0"/>
-          </a:p>
-        </p:txBody>
-      </p:sp>
+      <mc:AlternateContent xmlns:mc="http://schemas.openxmlformats.org/markup-compatibility/2006">
+        <mc:Choice xmlns:a14="http://schemas.microsoft.com/office/drawing/2010/main" Requires="a14">
+          <p:sp>
+            <p:nvSpPr>
+              <p:cNvPr id="3" name="Content Placeholder 2"/>
+              <p:cNvSpPr>
+                <a:spLocks noGrp="1"/>
+              </p:cNvSpPr>
+              <p:nvPr>
+                <p:ph idx="1"/>
+              </p:nvPr>
+            </p:nvSpPr>
+            <p:spPr/>
+            <p:txBody>
+              <a:bodyPr/>
+              <a:lstStyle/>
+              <a:p>
+                <a:pPr algn="just"/>
+                <a:r>
+                  <a:rPr lang="en-US" dirty="0"/>
+                  <a:t>A </a:t>
+                </a:r>
+                <a:r>
+                  <a:rPr lang="en-US" dirty="0" err="1"/>
+                  <a:t>fázis</a:t>
+                </a:r>
+                <a:r>
+                  <a:rPr lang="en-US" dirty="0"/>
+                  <a:t> </a:t>
+                </a:r>
+                <a:r>
+                  <a:rPr lang="en-US" dirty="0" err="1"/>
+                  <a:t>funkció</a:t>
+                </a:r>
+                <a:r>
+                  <a:rPr lang="en-US" dirty="0"/>
+                  <a:t> </a:t>
+                </a:r>
+                <a:r>
+                  <a:rPr lang="en-US" dirty="0" err="1"/>
+                  <a:t>megmondja</a:t>
+                </a:r>
+                <a:r>
+                  <a:rPr lang="en-US" dirty="0"/>
+                  <a:t>, </a:t>
+                </a:r>
+                <a:r>
+                  <a:rPr lang="en-US" dirty="0" err="1"/>
+                  <a:t>hogy</a:t>
+                </a:r>
+                <a:r>
+                  <a:rPr lang="en-US" dirty="0"/>
+                  <a:t> </a:t>
+                </a:r>
+                <a:r>
+                  <a:rPr lang="en-US" dirty="0" err="1"/>
+                  <a:t>egy</a:t>
+                </a:r>
+                <a:r>
+                  <a:rPr lang="en-US" dirty="0"/>
+                  <a:t> </a:t>
+                </a:r>
+                <a:r>
+                  <a:rPr lang="en-US" dirty="0" err="1"/>
+                  <a:t>adott</a:t>
+                </a:r>
+                <a:r>
+                  <a:rPr lang="en-US" dirty="0"/>
+                  <a:t> </a:t>
+                </a:r>
+                <a:r>
+                  <a:rPr lang="en-US" dirty="0" err="1"/>
+                  <a:t>pontból</a:t>
+                </a:r>
+                <a:r>
+                  <a:rPr lang="en-US" dirty="0"/>
+                  <a:t> </a:t>
+                </a:r>
+                <a:r>
+                  <a:rPr lang="en-US" dirty="0" err="1"/>
+                  <a:t>mennyi</a:t>
+                </a:r>
+                <a:r>
+                  <a:rPr lang="en-US" dirty="0"/>
+                  <a:t> </a:t>
+                </a:r>
+                <a:r>
+                  <a:rPr lang="en-US" dirty="0" err="1"/>
+                  <a:t>fény</a:t>
+                </a:r>
+                <a:r>
+                  <a:rPr lang="en-US" dirty="0"/>
+                  <a:t> jut el a </a:t>
+                </a:r>
+                <a:r>
+                  <a:rPr lang="en-US" dirty="0" err="1"/>
+                  <a:t>szemünkbe</a:t>
+                </a:r>
+                <a:r>
+                  <a:rPr lang="en-US" dirty="0"/>
+                  <a:t>.</a:t>
+                </a:r>
+              </a:p>
+              <a:p>
+                <a:pPr algn="just"/>
+                <a14:m>
+                  <m:oMath xmlns:m="http://schemas.openxmlformats.org/officeDocument/2006/math">
+                    <m:r>
+                      <m:rPr>
+                        <m:sty m:val="p"/>
+                      </m:rPr>
+                      <a:rPr lang="el-GR" i="1" dirty="0" smtClean="0">
+                        <a:latin typeface="Cambria Math" panose="02040503050406030204" pitchFamily="18" charset="0"/>
+                        <a:ea typeface="Cambria Math" panose="02040503050406030204" pitchFamily="18" charset="0"/>
+                      </a:rPr>
+                      <m:t>Θ</m:t>
+                    </m:r>
+                  </m:oMath>
+                </a14:m>
+                <a:r>
+                  <a:rPr lang="en-US" dirty="0"/>
+                  <a:t> a </a:t>
+                </a:r>
+                <a:r>
+                  <a:rPr lang="en-US" dirty="0" err="1"/>
+                  <a:t>szemünkből</a:t>
+                </a:r>
+                <a:r>
+                  <a:rPr lang="en-US" dirty="0"/>
+                  <a:t> </a:t>
+                </a:r>
+                <a:r>
+                  <a:rPr lang="en-US" dirty="0" err="1"/>
+                  <a:t>egyenesen</a:t>
+                </a:r>
+                <a:r>
+                  <a:rPr lang="en-US" dirty="0"/>
+                  <a:t> </a:t>
+                </a:r>
+                <a:r>
+                  <a:rPr lang="en-US" dirty="0" err="1"/>
+                  <a:t>mutató</a:t>
+                </a:r>
+                <a:r>
+                  <a:rPr lang="en-US" dirty="0"/>
+                  <a:t> </a:t>
+                </a:r>
+                <a:r>
+                  <a:rPr lang="en-US" dirty="0" err="1"/>
+                  <a:t>vektor</a:t>
+                </a:r>
+                <a:r>
+                  <a:rPr lang="en-US" dirty="0"/>
+                  <a:t> s a nap </a:t>
+                </a:r>
+                <a:r>
+                  <a:rPr lang="en-US" dirty="0" err="1"/>
+                  <a:t>felé</a:t>
+                </a:r>
+                <a:r>
+                  <a:rPr lang="en-US" dirty="0"/>
+                  <a:t> </a:t>
+                </a:r>
+                <a:r>
+                  <a:rPr lang="en-US" dirty="0" err="1"/>
+                  <a:t>mutató</a:t>
+                </a:r>
+                <a:r>
+                  <a:rPr lang="en-US" dirty="0"/>
+                  <a:t> </a:t>
+                </a:r>
+                <a:r>
+                  <a:rPr lang="en-US" dirty="0" err="1"/>
+                  <a:t>vektor</a:t>
+                </a:r>
+                <a:r>
+                  <a:rPr lang="en-US" dirty="0"/>
+                  <a:t> </a:t>
+                </a:r>
+                <a:r>
+                  <a:rPr lang="en-US" dirty="0" err="1"/>
+                  <a:t>bezárt</a:t>
+                </a:r>
+                <a:r>
+                  <a:rPr lang="en-US" dirty="0"/>
+                  <a:t> </a:t>
+                </a:r>
+                <a:r>
+                  <a:rPr lang="en-US" dirty="0" err="1"/>
+                  <a:t>szöge</a:t>
+                </a:r>
+                <a:r>
+                  <a:rPr lang="en-US" dirty="0"/>
+                  <a:t>.</a:t>
+                </a:r>
+              </a:p>
+              <a:p>
+                <a:pPr algn="just"/>
+                <a:r>
+                  <a:rPr lang="en-US" dirty="0"/>
+                  <a:t>A </a:t>
+                </a:r>
+                <a14:m>
+                  <m:oMath xmlns:m="http://schemas.openxmlformats.org/officeDocument/2006/math">
+                    <m:r>
+                      <a:rPr lang="en-US" i="1" dirty="0" smtClean="0">
+                        <a:latin typeface="Cambria Math" panose="02040503050406030204" pitchFamily="18" charset="0"/>
+                      </a:rPr>
+                      <m:t>𝑔</m:t>
+                    </m:r>
+                  </m:oMath>
+                </a14:m>
+                <a:r>
+                  <a:rPr lang="en-US" dirty="0"/>
+                  <a:t> a </a:t>
+                </a:r>
+                <a:r>
+                  <a:rPr lang="en-US" dirty="0" err="1"/>
+                  <a:t>szóródás</a:t>
+                </a:r>
+                <a:r>
+                  <a:rPr lang="en-US" dirty="0"/>
+                  <a:t> </a:t>
+                </a:r>
+                <a:r>
+                  <a:rPr lang="en-US" dirty="0" err="1"/>
+                  <a:t>szimmetriáját</a:t>
+                </a:r>
+                <a:r>
+                  <a:rPr lang="en-US" dirty="0"/>
+                  <a:t> </a:t>
+                </a:r>
+                <a:r>
+                  <a:rPr lang="en-US" dirty="0" err="1"/>
+                  <a:t>kontrollálja</a:t>
+                </a:r>
+                <a:endParaRPr lang="en-US" dirty="0"/>
+              </a:p>
+              <a:p>
+                <a:pPr algn="just"/>
+                <a:endParaRPr lang="en-US" dirty="0"/>
+              </a:p>
+            </p:txBody>
+          </p:sp>
+        </mc:Choice>
+        <mc:Fallback>
+          <p:sp>
+            <p:nvSpPr>
+              <p:cNvPr id="3" name="Content Placeholder 2"/>
+              <p:cNvSpPr>
+                <a:spLocks noGrp="1" noRot="1" noChangeAspect="1" noMove="1" noResize="1" noEditPoints="1" noAdjustHandles="1" noChangeArrowheads="1" noChangeShapeType="1" noTextEdit="1"/>
+              </p:cNvSpPr>
+              <p:nvPr>
+                <p:ph idx="1"/>
+              </p:nvPr>
+            </p:nvSpPr>
+            <p:spPr>
+              <a:blipFill>
+                <a:blip r:embed="rId2"/>
+                <a:stretch>
+                  <a:fillRect l="-1515" t="-1667"/>
+                </a:stretch>
+              </a:blipFill>
+            </p:spPr>
+            <p:txBody>
+              <a:bodyPr/>
+              <a:lstStyle/>
+              <a:p>
+                <a:r>
+                  <a:rPr lang="hu-HU">
+                    <a:noFill/>
+                  </a:rPr>
+                  <a:t> </a:t>
+                </a:r>
+              </a:p>
+            </p:txBody>
+          </p:sp>
+        </mc:Fallback>
+      </mc:AlternateContent>
       <p:pic>
         <p:nvPicPr>
           <p:cNvPr id="5" name="Picture 4" descr="Diagram&#10;&#10;Description automatically generated"/>
@@ -5448,7 +5696,7 @@
           <p:nvPr/>
         </p:nvPicPr>
         <p:blipFill>
-          <a:blip r:embed="rId2"/>
+          <a:blip r:embed="rId3"/>
           <a:stretch>
             <a:fillRect/>
           </a:stretch>
@@ -5509,19 +5757,19 @@
           <a:lstStyle/>
           <a:p>
             <a:r>
-              <a:rPr lang="en-US" dirty="0" smtClean="0"/>
+              <a:rPr lang="en-US" dirty="0"/>
               <a:t>Ki-</a:t>
             </a:r>
             <a:r>
-              <a:rPr lang="en-US" dirty="0" err="1" smtClean="0"/>
+              <a:rPr lang="en-US" dirty="0" err="1"/>
               <a:t>szóródó</a:t>
             </a:r>
             <a:r>
-              <a:rPr lang="en-US" dirty="0" smtClean="0"/>
-              <a:t> </a:t>
-            </a:r>
-            <a:r>
-              <a:rPr lang="en-US" dirty="0" err="1" smtClean="0"/>
+              <a:rPr lang="en-US" dirty="0"/>
+              <a:t> </a:t>
+            </a:r>
+            <a:r>
+              <a:rPr lang="en-US" dirty="0" err="1"/>
               <a:t>egyenlet</a:t>
             </a:r>
             <a:endParaRPr lang="en-US" dirty="0"/>
@@ -5543,262 +5791,264 @@
           <a:bodyPr/>
           <a:lstStyle/>
           <a:p>
-            <a:r>
-              <a:rPr lang="en-US" dirty="0" err="1" smtClean="0"/>
+            <a:pPr algn="just"/>
+            <a:r>
+              <a:rPr lang="en-US" dirty="0" err="1"/>
               <a:t>Ez</a:t>
             </a:r>
             <a:r>
-              <a:rPr lang="en-US" dirty="0" smtClean="0"/>
-              <a:t> </a:t>
-            </a:r>
-            <a:r>
-              <a:rPr lang="en-US" dirty="0" err="1" smtClean="0"/>
+              <a:rPr lang="en-US" dirty="0"/>
+              <a:t> </a:t>
+            </a:r>
+            <a:r>
+              <a:rPr lang="en-US" dirty="0" err="1"/>
               <a:t>az</a:t>
             </a:r>
             <a:r>
-              <a:rPr lang="en-US" dirty="0" smtClean="0"/>
-              <a:t> </a:t>
-            </a:r>
-            <a:r>
-              <a:rPr lang="en-US" dirty="0" err="1" smtClean="0"/>
+              <a:rPr lang="en-US" dirty="0"/>
+              <a:t> </a:t>
+            </a:r>
+            <a:r>
+              <a:rPr lang="en-US" dirty="0" err="1"/>
               <a:t>egyenet</a:t>
             </a:r>
             <a:r>
-              <a:rPr lang="en-US" dirty="0" smtClean="0"/>
-              <a:t> </a:t>
-            </a:r>
-            <a:r>
-              <a:rPr lang="en-US" dirty="0" err="1" smtClean="0"/>
+              <a:rPr lang="en-US" dirty="0"/>
+              <a:t> </a:t>
+            </a:r>
+            <a:r>
+              <a:rPr lang="en-US" dirty="0" err="1"/>
               <a:t>azt</a:t>
             </a:r>
             <a:r>
-              <a:rPr lang="en-US" dirty="0" smtClean="0"/>
-              <a:t> </a:t>
-            </a:r>
-            <a:r>
-              <a:rPr lang="en-US" dirty="0" err="1" smtClean="0"/>
+              <a:rPr lang="en-US" dirty="0"/>
+              <a:t> </a:t>
+            </a:r>
+            <a:r>
+              <a:rPr lang="en-US" dirty="0" err="1"/>
               <a:t>mutatja</a:t>
             </a:r>
             <a:r>
-              <a:rPr lang="en-US" dirty="0" smtClean="0"/>
+              <a:rPr lang="en-US" dirty="0"/>
               <a:t>, </a:t>
             </a:r>
             <a:r>
-              <a:rPr lang="en-US" dirty="0" err="1" smtClean="0"/>
+              <a:rPr lang="en-US" dirty="0" err="1"/>
               <a:t>hogy</a:t>
             </a:r>
             <a:r>
-              <a:rPr lang="en-US" dirty="0" smtClean="0"/>
-              <a:t> </a:t>
-            </a:r>
-            <a:r>
-              <a:rPr lang="en-US" dirty="0" err="1" smtClean="0"/>
+              <a:rPr lang="en-US" dirty="0"/>
+              <a:t> </a:t>
+            </a:r>
+            <a:r>
+              <a:rPr lang="en-US" dirty="0" err="1"/>
               <a:t>mekkora</a:t>
             </a:r>
             <a:r>
-              <a:rPr lang="en-US" dirty="0" smtClean="0"/>
-              <a:t> </a:t>
-            </a:r>
-            <a:r>
-              <a:rPr lang="en-US" dirty="0" err="1" smtClean="0"/>
+              <a:rPr lang="en-US" dirty="0"/>
+              <a:t> </a:t>
+            </a:r>
+            <a:r>
+              <a:rPr lang="en-US" dirty="0" err="1"/>
               <a:t>az</a:t>
             </a:r>
             <a:r>
-              <a:rPr lang="en-US" dirty="0" smtClean="0"/>
-              <a:t> </a:t>
-            </a:r>
-            <a:r>
-              <a:rPr lang="en-US" dirty="0" err="1" smtClean="0"/>
+              <a:rPr lang="en-US" dirty="0"/>
+              <a:t> </a:t>
+            </a:r>
+            <a:r>
+              <a:rPr lang="en-US" dirty="0" err="1"/>
               <a:t>atmoszféra</a:t>
             </a:r>
             <a:r>
-              <a:rPr lang="en-US" dirty="0" smtClean="0"/>
-              <a:t> </a:t>
-            </a:r>
-            <a:r>
-              <a:rPr lang="en-US" dirty="0" err="1" smtClean="0"/>
+              <a:rPr lang="en-US" dirty="0"/>
+              <a:t> </a:t>
+            </a:r>
+            <a:r>
+              <a:rPr lang="en-US" dirty="0" err="1"/>
               <a:t>sűrűsége</a:t>
             </a:r>
             <a:r>
-              <a:rPr lang="en-US" dirty="0" smtClean="0"/>
-              <a:t> </a:t>
-            </a:r>
-            <a:r>
-              <a:rPr lang="en-US" dirty="0" err="1" smtClean="0"/>
+              <a:rPr lang="en-US" dirty="0"/>
+              <a:t> </a:t>
+            </a:r>
+            <a:r>
+              <a:rPr lang="en-US" dirty="0" err="1"/>
               <a:t>két</a:t>
             </a:r>
             <a:r>
-              <a:rPr lang="en-US" dirty="0" smtClean="0"/>
-              <a:t> </a:t>
-            </a:r>
-            <a:r>
-              <a:rPr lang="en-US" dirty="0" err="1" smtClean="0"/>
+              <a:rPr lang="en-US" dirty="0"/>
+              <a:t> </a:t>
+            </a:r>
+            <a:r>
+              <a:rPr lang="en-US" dirty="0" err="1"/>
               <a:t>adott</a:t>
             </a:r>
             <a:r>
-              <a:rPr lang="en-US" dirty="0" smtClean="0"/>
-              <a:t> </a:t>
-            </a:r>
-            <a:r>
-              <a:rPr lang="en-US" dirty="0" err="1" smtClean="0"/>
+              <a:rPr lang="en-US" dirty="0"/>
+              <a:t> </a:t>
+            </a:r>
+            <a:r>
+              <a:rPr lang="en-US" dirty="0" err="1"/>
               <a:t>pont</a:t>
             </a:r>
             <a:r>
-              <a:rPr lang="en-US" dirty="0" smtClean="0"/>
-              <a:t> </a:t>
-            </a:r>
-            <a:r>
-              <a:rPr lang="en-US" dirty="0" err="1" smtClean="0"/>
+              <a:rPr lang="en-US" dirty="0"/>
+              <a:t> </a:t>
+            </a:r>
+            <a:r>
+              <a:rPr lang="en-US" dirty="0" err="1"/>
               <a:t>között</a:t>
             </a:r>
             <a:r>
-              <a:rPr lang="en-US" dirty="0" smtClean="0"/>
+              <a:rPr lang="en-US" dirty="0"/>
               <a:t>. (</a:t>
             </a:r>
             <a:r>
-              <a:rPr lang="en-US" dirty="0" err="1" smtClean="0"/>
+              <a:rPr lang="en-US" dirty="0" err="1"/>
               <a:t>Mennyi</a:t>
             </a:r>
             <a:r>
-              <a:rPr lang="en-US" dirty="0" smtClean="0"/>
-              <a:t> </a:t>
-            </a:r>
-            <a:r>
-              <a:rPr lang="en-US" dirty="0" err="1" smtClean="0"/>
+              <a:rPr lang="en-US" dirty="0"/>
+              <a:t> </a:t>
+            </a:r>
+            <a:r>
+              <a:rPr lang="en-US" dirty="0" err="1"/>
               <a:t>részecskével</a:t>
             </a:r>
             <a:r>
-              <a:rPr lang="en-US" dirty="0" smtClean="0"/>
-              <a:t> </a:t>
-            </a:r>
-            <a:r>
-              <a:rPr lang="en-US" dirty="0" err="1" smtClean="0"/>
+              <a:rPr lang="en-US" dirty="0"/>
+              <a:t> </a:t>
+            </a:r>
+            <a:r>
+              <a:rPr lang="en-US" dirty="0" err="1"/>
               <a:t>találkozna</a:t>
             </a:r>
             <a:r>
-              <a:rPr lang="en-US" dirty="0" smtClean="0"/>
-              <a:t> </a:t>
-            </a:r>
-            <a:r>
-              <a:rPr lang="en-US" dirty="0" err="1" smtClean="0"/>
+              <a:rPr lang="en-US" dirty="0"/>
+              <a:t> </a:t>
+            </a:r>
+            <a:r>
+              <a:rPr lang="en-US" dirty="0" err="1"/>
               <a:t>egy</a:t>
             </a:r>
             <a:r>
-              <a:rPr lang="en-US" dirty="0" smtClean="0"/>
-              <a:t> </a:t>
-            </a:r>
-            <a:r>
-              <a:rPr lang="en-US" dirty="0" err="1" smtClean="0"/>
+              <a:rPr lang="en-US" dirty="0"/>
+              <a:t> </a:t>
+            </a:r>
+            <a:r>
+              <a:rPr lang="en-US" dirty="0" err="1"/>
               <a:t>adott</a:t>
             </a:r>
             <a:r>
-              <a:rPr lang="en-US" dirty="0" smtClean="0"/>
-              <a:t> </a:t>
-            </a:r>
-            <a:r>
-              <a:rPr lang="en-US" dirty="0" err="1" smtClean="0"/>
+              <a:rPr lang="en-US" dirty="0"/>
+              <a:t> </a:t>
+            </a:r>
+            <a:r>
+              <a:rPr lang="en-US" dirty="0" err="1"/>
               <a:t>hullámhosszú</a:t>
             </a:r>
             <a:r>
-              <a:rPr lang="en-US" dirty="0" smtClean="0"/>
-              <a:t> </a:t>
-            </a:r>
-            <a:r>
-              <a:rPr lang="en-US" dirty="0" err="1" smtClean="0"/>
+              <a:rPr lang="en-US" dirty="0"/>
+              <a:t> </a:t>
+            </a:r>
+            <a:r>
+              <a:rPr lang="en-US" dirty="0" err="1"/>
               <a:t>fénysugár</a:t>
             </a:r>
             <a:r>
-              <a:rPr lang="en-US" dirty="0" smtClean="0"/>
+              <a:rPr lang="en-US" dirty="0"/>
               <a:t>)</a:t>
             </a:r>
           </a:p>
           <a:p>
-            <a:r>
-              <a:rPr lang="en-US" dirty="0" err="1" smtClean="0"/>
+            <a:pPr algn="just"/>
+            <a:r>
+              <a:rPr lang="en-US" dirty="0" err="1"/>
               <a:t>Itt</a:t>
             </a:r>
             <a:r>
-              <a:rPr lang="en-US" dirty="0" smtClean="0"/>
+              <a:rPr lang="en-US" dirty="0"/>
               <a:t> K </a:t>
             </a:r>
             <a:r>
-              <a:rPr lang="en-US" dirty="0" err="1" smtClean="0"/>
+              <a:rPr lang="en-US" dirty="0" err="1"/>
               <a:t>azt</a:t>
             </a:r>
             <a:r>
-              <a:rPr lang="en-US" dirty="0" smtClean="0"/>
-              <a:t> </a:t>
-            </a:r>
-            <a:r>
-              <a:rPr lang="en-US" dirty="0" err="1" smtClean="0"/>
+              <a:rPr lang="en-US" dirty="0"/>
+              <a:t> </a:t>
+            </a:r>
+            <a:r>
+              <a:rPr lang="en-US" dirty="0" err="1"/>
               <a:t>adja</a:t>
             </a:r>
             <a:r>
-              <a:rPr lang="en-US" dirty="0" smtClean="0"/>
+              <a:rPr lang="en-US" dirty="0"/>
               <a:t> meg </a:t>
             </a:r>
             <a:r>
-              <a:rPr lang="en-US" dirty="0" err="1" smtClean="0"/>
+              <a:rPr lang="en-US" dirty="0" err="1"/>
               <a:t>hogy</a:t>
             </a:r>
             <a:r>
-              <a:rPr lang="en-US" dirty="0" smtClean="0"/>
-              <a:t> </a:t>
-            </a:r>
-            <a:r>
-              <a:rPr lang="en-US" dirty="0" err="1" smtClean="0"/>
+              <a:rPr lang="en-US" dirty="0"/>
+              <a:t> </a:t>
+            </a:r>
+            <a:r>
+              <a:rPr lang="en-US" dirty="0" err="1"/>
               <a:t>egy</a:t>
             </a:r>
             <a:r>
-              <a:rPr lang="en-US" dirty="0" smtClean="0"/>
-              <a:t> </a:t>
-            </a:r>
-            <a:r>
-              <a:rPr lang="en-US" dirty="0" err="1" smtClean="0"/>
+              <a:rPr lang="en-US" dirty="0"/>
+              <a:t> </a:t>
+            </a:r>
+            <a:r>
+              <a:rPr lang="en-US" dirty="0" err="1"/>
               <a:t>bizonyos</a:t>
             </a:r>
             <a:r>
-              <a:rPr lang="en-US" dirty="0" smtClean="0"/>
-              <a:t> </a:t>
-            </a:r>
-            <a:r>
-              <a:rPr lang="en-US" dirty="0" err="1" smtClean="0"/>
+              <a:rPr lang="en-US" dirty="0"/>
+              <a:t> </a:t>
+            </a:r>
+            <a:r>
+              <a:rPr lang="en-US" dirty="0" err="1"/>
               <a:t>hullámhosszú</a:t>
             </a:r>
             <a:r>
-              <a:rPr lang="en-US" dirty="0" smtClean="0"/>
-              <a:t> </a:t>
-            </a:r>
-            <a:r>
-              <a:rPr lang="en-US" dirty="0" err="1" smtClean="0"/>
+              <a:rPr lang="en-US" dirty="0"/>
+              <a:t> </a:t>
+            </a:r>
+            <a:r>
+              <a:rPr lang="en-US" dirty="0" err="1"/>
               <a:t>fény</a:t>
             </a:r>
             <a:r>
-              <a:rPr lang="en-US" dirty="0" smtClean="0"/>
-              <a:t> </a:t>
-            </a:r>
-            <a:r>
-              <a:rPr lang="en-US" dirty="0" err="1" smtClean="0"/>
+              <a:rPr lang="en-US" dirty="0"/>
+              <a:t> </a:t>
+            </a:r>
+            <a:r>
+              <a:rPr lang="en-US" dirty="0" err="1"/>
               <a:t>mennyi</a:t>
             </a:r>
             <a:r>
-              <a:rPr lang="en-US" dirty="0" smtClean="0"/>
-              <a:t> </a:t>
-            </a:r>
-            <a:r>
-              <a:rPr lang="en-US" dirty="0" err="1" smtClean="0"/>
+              <a:rPr lang="en-US" dirty="0"/>
+              <a:t> </a:t>
+            </a:r>
+            <a:r>
+              <a:rPr lang="en-US" dirty="0" err="1"/>
               <a:t>részecskével</a:t>
             </a:r>
             <a:r>
-              <a:rPr lang="en-US" dirty="0" smtClean="0"/>
-              <a:t> </a:t>
-            </a:r>
-            <a:r>
-              <a:rPr lang="en-US" dirty="0" err="1" smtClean="0"/>
+              <a:rPr lang="en-US" dirty="0"/>
+              <a:t> </a:t>
+            </a:r>
+            <a:r>
+              <a:rPr lang="en-US" dirty="0" err="1"/>
               <a:t>találkozna</a:t>
             </a:r>
             <a:r>
-              <a:rPr lang="en-US" dirty="0" smtClean="0"/>
+              <a:rPr lang="en-US" dirty="0"/>
               <a:t>.</a:t>
             </a:r>
           </a:p>
@@ -5872,19 +6122,19 @@
           <a:lstStyle/>
           <a:p>
             <a:r>
-              <a:rPr lang="en-US" dirty="0" smtClean="0"/>
+              <a:rPr lang="en-US" dirty="0"/>
               <a:t>Be-</a:t>
             </a:r>
             <a:r>
-              <a:rPr lang="en-US" dirty="0" err="1" smtClean="0"/>
+              <a:rPr lang="en-US" dirty="0" err="1"/>
               <a:t>szóródó</a:t>
             </a:r>
             <a:r>
-              <a:rPr lang="en-US" dirty="0" smtClean="0"/>
-              <a:t> </a:t>
-            </a:r>
-            <a:r>
-              <a:rPr lang="en-US" dirty="0" err="1" smtClean="0"/>
+              <a:rPr lang="en-US" dirty="0"/>
+              <a:t> </a:t>
+            </a:r>
+            <a:r>
+              <a:rPr lang="en-US" dirty="0" err="1"/>
               <a:t>egyenlet</a:t>
             </a:r>
             <a:endParaRPr lang="en-US" dirty="0"/>
@@ -5906,212 +6156,211 @@
           <a:bodyPr/>
           <a:lstStyle/>
           <a:p>
-            <a:pPr marL="0" indent="0">
+            <a:pPr marL="0" indent="0" algn="just">
               <a:buNone/>
             </a:pPr>
             <a:r>
-              <a:rPr lang="en-US" dirty="0" err="1" smtClean="0"/>
+              <a:rPr lang="en-US" dirty="0" err="1"/>
               <a:t>Ez</a:t>
             </a:r>
             <a:r>
-              <a:rPr lang="en-US" dirty="0" smtClean="0"/>
-              <a:t> </a:t>
-            </a:r>
-            <a:r>
-              <a:rPr lang="en-US" dirty="0" err="1" smtClean="0"/>
+              <a:rPr lang="en-US" dirty="0"/>
+              <a:t> </a:t>
+            </a:r>
+            <a:r>
+              <a:rPr lang="en-US" dirty="0" err="1"/>
               <a:t>az</a:t>
             </a:r>
             <a:r>
-              <a:rPr lang="en-US" dirty="0" smtClean="0"/>
-              <a:t> </a:t>
-            </a:r>
-            <a:r>
-              <a:rPr lang="en-US" dirty="0" err="1" smtClean="0"/>
+              <a:rPr lang="en-US" dirty="0"/>
+              <a:t> </a:t>
+            </a:r>
+            <a:r>
+              <a:rPr lang="en-US" dirty="0" err="1"/>
               <a:t>egyenlet</a:t>
             </a:r>
             <a:r>
-              <a:rPr lang="en-US" dirty="0" smtClean="0"/>
-              <a:t> </a:t>
-            </a:r>
-            <a:r>
-              <a:rPr lang="en-US" dirty="0" err="1" smtClean="0"/>
+              <a:rPr lang="en-US" dirty="0"/>
+              <a:t> </a:t>
+            </a:r>
+            <a:r>
+              <a:rPr lang="en-US" dirty="0" err="1"/>
               <a:t>azt</a:t>
             </a:r>
             <a:r>
-              <a:rPr lang="en-US" dirty="0" smtClean="0"/>
-              <a:t> </a:t>
-            </a:r>
-            <a:r>
-              <a:rPr lang="en-US" dirty="0" err="1" smtClean="0"/>
+              <a:rPr lang="en-US" dirty="0"/>
+              <a:t> </a:t>
+            </a:r>
+            <a:r>
+              <a:rPr lang="en-US" dirty="0" err="1"/>
               <a:t>mondja</a:t>
             </a:r>
             <a:r>
-              <a:rPr lang="en-US" dirty="0" smtClean="0"/>
+              <a:rPr lang="en-US" dirty="0"/>
               <a:t> meg, </a:t>
             </a:r>
             <a:r>
-              <a:rPr lang="en-US" dirty="0" err="1" smtClean="0"/>
+              <a:rPr lang="en-US" dirty="0" err="1"/>
               <a:t>hogy</a:t>
             </a:r>
             <a:r>
-              <a:rPr lang="en-US" dirty="0" smtClean="0"/>
-              <a:t> </a:t>
-            </a:r>
-            <a:r>
-              <a:rPr lang="en-US" dirty="0" err="1" smtClean="0"/>
+              <a:rPr lang="en-US" dirty="0"/>
+              <a:t> </a:t>
+            </a:r>
+            <a:r>
+              <a:rPr lang="en-US" dirty="0" err="1"/>
               <a:t>egy</a:t>
             </a:r>
             <a:r>
-              <a:rPr lang="en-US" dirty="0" smtClean="0"/>
-              <a:t> </a:t>
-            </a:r>
-            <a:r>
-              <a:rPr lang="en-US" dirty="0" err="1" smtClean="0"/>
+              <a:rPr lang="en-US" dirty="0"/>
+              <a:t> </a:t>
+            </a:r>
+            <a:r>
+              <a:rPr lang="en-US" dirty="0" err="1"/>
               <a:t>adott</a:t>
             </a:r>
             <a:r>
-              <a:rPr lang="en-US" dirty="0" smtClean="0"/>
-              <a:t> </a:t>
-            </a:r>
-            <a:r>
-              <a:rPr lang="en-US" dirty="0" err="1" smtClean="0"/>
+              <a:rPr lang="en-US" dirty="0"/>
+              <a:t> </a:t>
+            </a:r>
+            <a:r>
+              <a:rPr lang="en-US" dirty="0" err="1"/>
               <a:t>úton</a:t>
             </a:r>
             <a:r>
-              <a:rPr lang="en-US" dirty="0" smtClean="0"/>
+              <a:rPr lang="en-US" dirty="0"/>
               <a:t> (</a:t>
             </a:r>
             <a:r>
-              <a:rPr lang="en-US" dirty="0" err="1" smtClean="0"/>
+              <a:rPr lang="en-US" dirty="0" err="1"/>
               <a:t>két</a:t>
             </a:r>
             <a:r>
-              <a:rPr lang="en-US" dirty="0" smtClean="0"/>
-              <a:t> </a:t>
-            </a:r>
-            <a:r>
-              <a:rPr lang="en-US" dirty="0" err="1" smtClean="0"/>
+              <a:rPr lang="en-US" dirty="0"/>
+              <a:t> </a:t>
+            </a:r>
+            <a:r>
+              <a:rPr lang="en-US" dirty="0" err="1"/>
               <a:t>pont</a:t>
             </a:r>
             <a:r>
-              <a:rPr lang="en-US" dirty="0" smtClean="0"/>
-              <a:t> </a:t>
-            </a:r>
-            <a:r>
-              <a:rPr lang="en-US" dirty="0" err="1" smtClean="0"/>
+              <a:rPr lang="en-US" dirty="0"/>
+              <a:t> </a:t>
+            </a:r>
+            <a:r>
+              <a:rPr lang="en-US" dirty="0" err="1"/>
               <a:t>között</a:t>
             </a:r>
             <a:r>
-              <a:rPr lang="en-US" dirty="0" smtClean="0"/>
+              <a:rPr lang="en-US" dirty="0"/>
               <a:t>) </a:t>
             </a:r>
             <a:r>
-              <a:rPr lang="en-US" dirty="0" err="1" smtClean="0"/>
+              <a:rPr lang="en-US" dirty="0" err="1"/>
               <a:t>mennyi</a:t>
             </a:r>
             <a:r>
-              <a:rPr lang="en-US" dirty="0" smtClean="0"/>
-              <a:t> </a:t>
-            </a:r>
-            <a:r>
-              <a:rPr lang="en-US" dirty="0" err="1" smtClean="0"/>
+              <a:rPr lang="en-US" dirty="0"/>
+              <a:t> </a:t>
+            </a:r>
+            <a:r>
+              <a:rPr lang="en-US" dirty="0" err="1"/>
               <a:t>fény</a:t>
             </a:r>
             <a:r>
-              <a:rPr lang="en-US" dirty="0" smtClean="0"/>
-              <a:t> </a:t>
-            </a:r>
-            <a:r>
-              <a:rPr lang="en-US" dirty="0" err="1" smtClean="0"/>
+              <a:rPr lang="en-US" dirty="0"/>
+              <a:t> </a:t>
+            </a:r>
+            <a:r>
+              <a:rPr lang="en-US" dirty="0" err="1"/>
               <a:t>verődik</a:t>
             </a:r>
             <a:r>
-              <a:rPr lang="en-US" dirty="0" smtClean="0"/>
-              <a:t> </a:t>
-            </a:r>
-            <a:r>
-              <a:rPr lang="en-US" dirty="0" err="1" smtClean="0"/>
+              <a:rPr lang="en-US" dirty="0"/>
+              <a:t> </a:t>
+            </a:r>
+            <a:r>
+              <a:rPr lang="en-US" dirty="0" err="1"/>
               <a:t>pontosan</a:t>
             </a:r>
             <a:r>
-              <a:rPr lang="en-US" dirty="0" smtClean="0"/>
-              <a:t> </a:t>
-            </a:r>
-            <a:r>
-              <a:rPr lang="en-US" dirty="0" err="1" smtClean="0"/>
+              <a:rPr lang="en-US" dirty="0"/>
+              <a:t> </a:t>
+            </a:r>
+            <a:r>
+              <a:rPr lang="en-US" dirty="0" err="1"/>
               <a:t>az</a:t>
             </a:r>
             <a:r>
-              <a:rPr lang="en-US" dirty="0" smtClean="0"/>
-              <a:t> </a:t>
-            </a:r>
-            <a:r>
-              <a:rPr lang="en-US" dirty="0" err="1" smtClean="0"/>
+              <a:rPr lang="en-US" dirty="0"/>
+              <a:t> </a:t>
+            </a:r>
+            <a:r>
+              <a:rPr lang="en-US" dirty="0" err="1"/>
               <a:t>út</a:t>
             </a:r>
             <a:r>
-              <a:rPr lang="en-US" dirty="0" smtClean="0"/>
-              <a:t> </a:t>
-            </a:r>
-            <a:r>
-              <a:rPr lang="en-US" dirty="0" err="1" smtClean="0"/>
+              <a:rPr lang="en-US" dirty="0"/>
+              <a:t> </a:t>
+            </a:r>
+            <a:r>
+              <a:rPr lang="en-US" dirty="0" err="1"/>
               <a:t>irányába</a:t>
             </a:r>
-            <a:endParaRPr lang="en-US" dirty="0" smtClean="0"/>
-          </a:p>
-          <a:p>
-            <a:pPr marL="0" indent="0">
+            <a:endParaRPr lang="en-US" dirty="0"/>
+          </a:p>
+          <a:p>
+            <a:pPr marL="0" indent="0" algn="just">
               <a:buNone/>
             </a:pPr>
             <a:r>
-              <a:rPr lang="en-US" dirty="0" err="1" smtClean="0"/>
+              <a:rPr lang="en-US" dirty="0" err="1"/>
               <a:t>Itt</a:t>
             </a:r>
             <a:r>
-              <a:rPr lang="en-US" dirty="0" smtClean="0"/>
-              <a:t> </a:t>
-            </a:r>
-            <a:r>
-              <a:rPr lang="en-US" dirty="0" err="1" smtClean="0"/>
+              <a:rPr lang="en-US" dirty="0"/>
+              <a:t> </a:t>
+            </a:r>
+            <a:r>
+              <a:rPr lang="en-US" dirty="0" err="1"/>
               <a:t>az</a:t>
             </a:r>
             <a:r>
-              <a:rPr lang="en-US" dirty="0" smtClean="0"/>
+              <a:rPr lang="en-US" dirty="0"/>
               <a:t> I</a:t>
             </a:r>
             <a:r>
-              <a:rPr lang="en-US" sz="1400" dirty="0" smtClean="0"/>
+              <a:rPr lang="en-US" sz="1400" dirty="0"/>
               <a:t>s</a:t>
             </a:r>
             <a:r>
-              <a:rPr lang="en-US" dirty="0" smtClean="0"/>
-              <a:t> </a:t>
-            </a:r>
-            <a:r>
-              <a:rPr lang="en-US" dirty="0" err="1" smtClean="0"/>
+              <a:rPr lang="en-US" dirty="0"/>
+              <a:t> </a:t>
+            </a:r>
+            <a:r>
+              <a:rPr lang="en-US" dirty="0" err="1"/>
               <a:t>változó</a:t>
             </a:r>
             <a:r>
-              <a:rPr lang="en-US" dirty="0" smtClean="0"/>
+              <a:rPr lang="en-US" dirty="0"/>
               <a:t> a nap </a:t>
             </a:r>
             <a:r>
-              <a:rPr lang="en-US" dirty="0" err="1" smtClean="0"/>
+              <a:rPr lang="en-US" dirty="0" err="1"/>
               <a:t>fényerősségét</a:t>
             </a:r>
             <a:r>
-              <a:rPr lang="en-US" dirty="0" smtClean="0"/>
-              <a:t> </a:t>
-            </a:r>
-            <a:r>
-              <a:rPr lang="en-US" dirty="0" err="1" smtClean="0"/>
+              <a:rPr lang="en-US" dirty="0"/>
+              <a:t> </a:t>
+            </a:r>
+            <a:r>
+              <a:rPr lang="en-US" dirty="0" err="1"/>
               <a:t>határozza</a:t>
             </a:r>
             <a:r>
-              <a:rPr lang="en-US" dirty="0" smtClean="0"/>
+              <a:rPr lang="en-US" dirty="0"/>
               <a:t> meg.</a:t>
             </a:r>
-            <a:endParaRPr lang="en-US" dirty="0"/>
           </a:p>
         </p:txBody>
       </p:sp>
@@ -6183,23 +6432,23 @@
           <a:lstStyle/>
           <a:p>
             <a:r>
-              <a:rPr lang="en-US" dirty="0" err="1" smtClean="0"/>
+              <a:rPr lang="en-US" dirty="0" err="1"/>
               <a:t>Az</a:t>
             </a:r>
             <a:r>
-              <a:rPr lang="en-US" dirty="0" smtClean="0"/>
-              <a:t> </a:t>
-            </a:r>
-            <a:r>
-              <a:rPr lang="en-US" dirty="0" err="1" smtClean="0"/>
+              <a:rPr lang="en-US" dirty="0"/>
+              <a:t> </a:t>
+            </a:r>
+            <a:r>
+              <a:rPr lang="en-US" dirty="0" err="1"/>
               <a:t>atmoszféra</a:t>
             </a:r>
             <a:r>
-              <a:rPr lang="en-US" dirty="0" smtClean="0"/>
-              <a:t> </a:t>
-            </a:r>
-            <a:r>
-              <a:rPr lang="en-US" dirty="0" err="1" smtClean="0"/>
+              <a:rPr lang="en-US" dirty="0"/>
+              <a:t> </a:t>
+            </a:r>
+            <a:r>
+              <a:rPr lang="en-US" dirty="0" err="1"/>
               <a:t>határai</a:t>
             </a:r>
             <a:endParaRPr lang="en-US" dirty="0"/>
@@ -6216,339 +6465,385 @@
             <p:ph idx="1"/>
           </p:nvPr>
         </p:nvSpPr>
-        <p:spPr/>
+        <p:spPr>
+          <a:xfrm>
+            <a:off x="1097280" y="1845734"/>
+            <a:ext cx="5284269" cy="4023360"/>
+          </a:xfrm>
+        </p:spPr>
         <p:txBody>
           <a:bodyPr/>
           <a:lstStyle/>
           <a:p>
-            <a:r>
-              <a:rPr lang="en-US" dirty="0" smtClean="0"/>
+            <a:pPr algn="just"/>
+            <a:r>
+              <a:rPr lang="en-US" dirty="0"/>
               <a:t>A </a:t>
             </a:r>
             <a:r>
-              <a:rPr lang="en-US" dirty="0" err="1" smtClean="0"/>
+              <a:rPr lang="en-US" dirty="0" err="1"/>
               <a:t>megjelenítés</a:t>
             </a:r>
             <a:r>
-              <a:rPr lang="en-US" dirty="0" smtClean="0"/>
-              <a:t> </a:t>
-            </a:r>
-            <a:r>
-              <a:rPr lang="en-US" dirty="0" err="1" smtClean="0"/>
+              <a:rPr lang="en-US" dirty="0"/>
+              <a:t> </a:t>
+            </a:r>
+            <a:r>
+              <a:rPr lang="en-US" dirty="0" err="1"/>
               <a:t>két</a:t>
             </a:r>
             <a:r>
-              <a:rPr lang="en-US" dirty="0" smtClean="0"/>
-              <a:t> </a:t>
-            </a:r>
-            <a:r>
-              <a:rPr lang="en-US" dirty="0" err="1" smtClean="0"/>
+              <a:rPr lang="en-US" dirty="0"/>
+              <a:t> </a:t>
+            </a:r>
+            <a:r>
+              <a:rPr lang="en-US" dirty="0" err="1"/>
               <a:t>fázisban</a:t>
             </a:r>
             <a:r>
-              <a:rPr lang="en-US" dirty="0" smtClean="0"/>
-              <a:t> </a:t>
-            </a:r>
-            <a:r>
-              <a:rPr lang="en-US" dirty="0" err="1" smtClean="0"/>
+              <a:rPr lang="en-US" dirty="0"/>
+              <a:t> </a:t>
+            </a:r>
+            <a:r>
+              <a:rPr lang="en-US" dirty="0" err="1"/>
               <a:t>történik</a:t>
             </a:r>
             <a:r>
-              <a:rPr lang="en-US" dirty="0" smtClean="0"/>
+              <a:rPr lang="en-US" dirty="0"/>
               <a:t>. </a:t>
             </a:r>
             <a:r>
-              <a:rPr lang="en-US" dirty="0" err="1" smtClean="0"/>
+              <a:rPr lang="en-US" dirty="0" err="1"/>
               <a:t>Az</a:t>
             </a:r>
             <a:r>
-              <a:rPr lang="en-US" dirty="0" smtClean="0"/>
-              <a:t> </a:t>
-            </a:r>
-            <a:r>
-              <a:rPr lang="en-US" dirty="0" err="1" smtClean="0"/>
+              <a:rPr lang="en-US" dirty="0"/>
+              <a:t> </a:t>
+            </a:r>
+            <a:r>
+              <a:rPr lang="en-US" dirty="0" err="1"/>
               <a:t>első</a:t>
             </a:r>
             <a:r>
-              <a:rPr lang="en-US" dirty="0" smtClean="0"/>
-              <a:t> </a:t>
-            </a:r>
-            <a:r>
-              <a:rPr lang="en-US" dirty="0" err="1" smtClean="0"/>
+              <a:rPr lang="en-US" dirty="0"/>
+              <a:t> </a:t>
+            </a:r>
+            <a:r>
+              <a:rPr lang="en-US" dirty="0" err="1"/>
               <a:t>fázis</a:t>
             </a:r>
             <a:r>
-              <a:rPr lang="en-US" dirty="0" smtClean="0"/>
-              <a:t> </a:t>
-            </a:r>
-            <a:r>
-              <a:rPr lang="en-US" dirty="0" err="1" smtClean="0"/>
+              <a:rPr lang="en-US" dirty="0"/>
+              <a:t> </a:t>
+            </a:r>
+            <a:r>
+              <a:rPr lang="en-US" dirty="0" err="1"/>
               <a:t>poligonhálóval</a:t>
             </a:r>
             <a:r>
-              <a:rPr lang="en-US" dirty="0" smtClean="0"/>
-              <a:t> </a:t>
-            </a:r>
-            <a:r>
-              <a:rPr lang="en-US" dirty="0" err="1" smtClean="0"/>
+              <a:rPr lang="en-US" dirty="0"/>
+              <a:t> </a:t>
+            </a:r>
+            <a:r>
+              <a:rPr lang="en-US" dirty="0" err="1"/>
               <a:t>rendelkező</a:t>
             </a:r>
             <a:r>
-              <a:rPr lang="en-US" dirty="0" smtClean="0"/>
-              <a:t> </a:t>
-            </a:r>
-            <a:r>
-              <a:rPr lang="en-US" dirty="0" err="1" smtClean="0"/>
+              <a:rPr lang="en-US" dirty="0"/>
+              <a:t> </a:t>
+            </a:r>
+            <a:r>
+              <a:rPr lang="en-US" dirty="0" err="1"/>
               <a:t>modelleket</a:t>
             </a:r>
             <a:r>
-              <a:rPr lang="en-US" dirty="0" smtClean="0"/>
-              <a:t> </a:t>
-            </a:r>
-            <a:r>
-              <a:rPr lang="en-US" dirty="0" err="1" smtClean="0"/>
+              <a:rPr lang="en-US" dirty="0"/>
+              <a:t> </a:t>
+            </a:r>
+            <a:r>
+              <a:rPr lang="en-US" dirty="0" err="1"/>
               <a:t>rajzol</a:t>
             </a:r>
             <a:r>
-              <a:rPr lang="en-US" dirty="0" smtClean="0"/>
-              <a:t> </a:t>
-            </a:r>
-            <a:r>
-              <a:rPr lang="en-US" dirty="0" err="1" smtClean="0"/>
+              <a:rPr lang="en-US" dirty="0"/>
+              <a:t> </a:t>
+            </a:r>
+            <a:r>
+              <a:rPr lang="en-US" dirty="0" err="1"/>
               <a:t>ki</a:t>
             </a:r>
             <a:r>
-              <a:rPr lang="en-US" dirty="0" smtClean="0"/>
+              <a:rPr lang="en-US" dirty="0"/>
               <a:t>, a </a:t>
             </a:r>
             <a:r>
-              <a:rPr lang="en-US" dirty="0" err="1" smtClean="0"/>
+              <a:rPr lang="en-US" dirty="0" err="1"/>
               <a:t>második</a:t>
             </a:r>
             <a:r>
-              <a:rPr lang="en-US" dirty="0" smtClean="0"/>
+              <a:rPr lang="en-US" dirty="0"/>
               <a:t> (post-process) </a:t>
             </a:r>
             <a:r>
-              <a:rPr lang="en-US" dirty="0" err="1" smtClean="0"/>
+              <a:rPr lang="en-US" dirty="0" err="1"/>
               <a:t>fázis</a:t>
             </a:r>
             <a:r>
-              <a:rPr lang="en-US" dirty="0" smtClean="0"/>
+              <a:rPr lang="en-US" dirty="0"/>
               <a:t> a </a:t>
             </a:r>
             <a:r>
-              <a:rPr lang="en-US" dirty="0" err="1" smtClean="0"/>
+              <a:rPr lang="en-US" dirty="0" err="1"/>
               <a:t>pixelek</a:t>
             </a:r>
             <a:r>
-              <a:rPr lang="en-US" dirty="0" smtClean="0"/>
-              <a:t> </a:t>
-            </a:r>
-            <a:r>
-              <a:rPr lang="en-US" dirty="0" err="1" smtClean="0"/>
+              <a:rPr lang="en-US" dirty="0"/>
+              <a:t> </a:t>
+            </a:r>
+            <a:r>
+              <a:rPr lang="en-US" dirty="0" err="1"/>
               <a:t>színét</a:t>
             </a:r>
             <a:r>
-              <a:rPr lang="en-US" dirty="0" smtClean="0"/>
-              <a:t> </a:t>
-            </a:r>
-            <a:r>
-              <a:rPr lang="en-US" dirty="0" err="1" smtClean="0"/>
+              <a:rPr lang="en-US" dirty="0"/>
+              <a:t> </a:t>
+            </a:r>
+            <a:r>
+              <a:rPr lang="en-US" dirty="0" err="1"/>
               <a:t>határozza</a:t>
             </a:r>
             <a:r>
-              <a:rPr lang="en-US" dirty="0" smtClean="0"/>
+              <a:rPr lang="en-US" dirty="0"/>
               <a:t> meg.</a:t>
             </a:r>
           </a:p>
           <a:p>
-            <a:r>
-              <a:rPr lang="en-US" dirty="0" smtClean="0"/>
+            <a:pPr algn="just"/>
+            <a:r>
+              <a:rPr lang="en-US" dirty="0"/>
               <a:t>A post process </a:t>
             </a:r>
             <a:r>
-              <a:rPr lang="en-US" dirty="0" err="1" smtClean="0"/>
+              <a:rPr lang="en-US" dirty="0" err="1"/>
               <a:t>fázisban</a:t>
             </a:r>
             <a:r>
-              <a:rPr lang="en-US" dirty="0" smtClean="0"/>
-              <a:t> </a:t>
-            </a:r>
-            <a:r>
-              <a:rPr lang="en-US" dirty="0" err="1" smtClean="0"/>
+              <a:rPr lang="en-US" dirty="0"/>
+              <a:t> </a:t>
+            </a:r>
+            <a:r>
+              <a:rPr lang="en-US" dirty="0" err="1"/>
               <a:t>minden</a:t>
             </a:r>
             <a:r>
-              <a:rPr lang="en-US" dirty="0" smtClean="0"/>
-              <a:t> </a:t>
-            </a:r>
-            <a:r>
-              <a:rPr lang="en-US" dirty="0" err="1" smtClean="0"/>
+              <a:rPr lang="en-US" dirty="0"/>
+              <a:t> </a:t>
+            </a:r>
+            <a:r>
+              <a:rPr lang="en-US" dirty="0" err="1"/>
               <a:t>képernyőpontból</a:t>
             </a:r>
             <a:r>
-              <a:rPr lang="en-US" dirty="0" smtClean="0"/>
-              <a:t> </a:t>
-            </a:r>
-            <a:r>
-              <a:rPr lang="en-US" dirty="0" err="1" smtClean="0"/>
+              <a:rPr lang="en-US" dirty="0"/>
+              <a:t> </a:t>
+            </a:r>
+            <a:r>
+              <a:rPr lang="en-US" dirty="0" err="1"/>
               <a:t>indítunk</a:t>
             </a:r>
             <a:r>
-              <a:rPr lang="en-US" dirty="0" smtClean="0"/>
-              <a:t> </a:t>
-            </a:r>
-            <a:r>
-              <a:rPr lang="en-US" dirty="0" err="1" smtClean="0"/>
+              <a:rPr lang="en-US" dirty="0"/>
+              <a:t> </a:t>
+            </a:r>
+            <a:r>
+              <a:rPr lang="en-US" dirty="0" err="1"/>
               <a:t>egy</a:t>
             </a:r>
             <a:r>
-              <a:rPr lang="en-US" dirty="0" smtClean="0"/>
-              <a:t> </a:t>
-            </a:r>
-            <a:r>
-              <a:rPr lang="en-US" dirty="0" err="1" smtClean="0"/>
+              <a:rPr lang="en-US" dirty="0"/>
+              <a:t> </a:t>
+            </a:r>
+            <a:r>
+              <a:rPr lang="en-US" dirty="0" err="1"/>
               <a:t>sugarat</a:t>
             </a:r>
             <a:r>
-              <a:rPr lang="en-US" dirty="0" smtClean="0"/>
-              <a:t> </a:t>
-            </a:r>
-            <a:r>
-              <a:rPr lang="en-US" dirty="0" err="1" smtClean="0"/>
+              <a:rPr lang="en-US" dirty="0"/>
+              <a:t> </a:t>
+            </a:r>
+            <a:r>
+              <a:rPr lang="en-US" dirty="0" err="1"/>
               <a:t>és</a:t>
             </a:r>
             <a:r>
-              <a:rPr lang="en-US" dirty="0" smtClean="0"/>
-              <a:t> </a:t>
-            </a:r>
-            <a:r>
-              <a:rPr lang="en-US" dirty="0" err="1" smtClean="0"/>
+              <a:rPr lang="en-US" dirty="0"/>
+              <a:t> </a:t>
+            </a:r>
+            <a:r>
+              <a:rPr lang="en-US" dirty="0" err="1"/>
               <a:t>megvizsgáljuk</a:t>
             </a:r>
             <a:r>
-              <a:rPr lang="en-US" dirty="0" smtClean="0"/>
+              <a:rPr lang="en-US" dirty="0"/>
               <a:t>, </a:t>
             </a:r>
             <a:r>
-              <a:rPr lang="en-US" dirty="0" err="1" smtClean="0"/>
+              <a:rPr lang="en-US" dirty="0" err="1"/>
               <a:t>hogy</a:t>
             </a:r>
             <a:r>
-              <a:rPr lang="en-US" dirty="0" smtClean="0"/>
-              <a:t> </a:t>
-            </a:r>
-            <a:r>
-              <a:rPr lang="en-US" dirty="0" err="1" smtClean="0"/>
+              <a:rPr lang="en-US" dirty="0"/>
+              <a:t> </a:t>
+            </a:r>
+            <a:r>
+              <a:rPr lang="en-US" dirty="0" err="1"/>
               <a:t>ez</a:t>
             </a:r>
             <a:r>
-              <a:rPr lang="en-US" dirty="0" smtClean="0"/>
+              <a:rPr lang="en-US" dirty="0"/>
               <a:t> a sugar </a:t>
             </a:r>
             <a:r>
-              <a:rPr lang="en-US" dirty="0" err="1" smtClean="0"/>
+              <a:rPr lang="en-US" dirty="0" err="1"/>
               <a:t>metszi</a:t>
             </a:r>
             <a:r>
-              <a:rPr lang="en-US" dirty="0" smtClean="0"/>
+              <a:rPr lang="en-US" dirty="0"/>
               <a:t>-e </a:t>
             </a:r>
             <a:r>
-              <a:rPr lang="en-US" dirty="0" err="1" smtClean="0"/>
+              <a:rPr lang="en-US" dirty="0" err="1"/>
               <a:t>az</a:t>
             </a:r>
             <a:r>
-              <a:rPr lang="en-US" dirty="0" smtClean="0"/>
-              <a:t> </a:t>
-            </a:r>
-            <a:r>
-              <a:rPr lang="en-US" dirty="0" err="1" smtClean="0"/>
+              <a:rPr lang="en-US" dirty="0"/>
+              <a:t> </a:t>
+            </a:r>
+            <a:r>
+              <a:rPr lang="en-US" dirty="0" err="1"/>
               <a:t>atmoszférát</a:t>
             </a:r>
             <a:r>
-              <a:rPr lang="en-US" dirty="0" smtClean="0"/>
+              <a:rPr lang="en-US" dirty="0"/>
               <a:t>.</a:t>
             </a:r>
           </a:p>
           <a:p>
-            <a:r>
-              <a:rPr lang="en-US" dirty="0" err="1" smtClean="0"/>
+            <a:pPr algn="just"/>
+            <a:r>
+              <a:rPr lang="en-US" dirty="0" err="1"/>
               <a:t>Az</a:t>
             </a:r>
             <a:r>
-              <a:rPr lang="en-US" dirty="0" smtClean="0"/>
-              <a:t> </a:t>
-            </a:r>
-            <a:r>
-              <a:rPr lang="en-US" dirty="0" err="1" smtClean="0"/>
+              <a:rPr lang="en-US" dirty="0"/>
+              <a:t> </a:t>
+            </a:r>
+            <a:r>
+              <a:rPr lang="en-US" dirty="0" err="1"/>
               <a:t>atmoszférát</a:t>
             </a:r>
             <a:r>
-              <a:rPr lang="en-US" dirty="0" smtClean="0"/>
-              <a:t> </a:t>
-            </a:r>
-            <a:r>
-              <a:rPr lang="en-US" dirty="0" err="1" smtClean="0"/>
+              <a:rPr lang="en-US" dirty="0"/>
+              <a:t> </a:t>
+            </a:r>
+            <a:r>
+              <a:rPr lang="en-US" dirty="0" err="1"/>
               <a:t>és</a:t>
             </a:r>
             <a:r>
-              <a:rPr lang="en-US" dirty="0" smtClean="0"/>
+              <a:rPr lang="en-US" dirty="0"/>
               <a:t> a </a:t>
             </a:r>
             <a:r>
-              <a:rPr lang="en-US" dirty="0" err="1" smtClean="0"/>
+              <a:rPr lang="en-US" dirty="0" err="1"/>
               <a:t>bolygót</a:t>
             </a:r>
             <a:r>
-              <a:rPr lang="en-US" dirty="0" smtClean="0"/>
+              <a:rPr lang="en-US" dirty="0"/>
               <a:t> is </a:t>
             </a:r>
             <a:r>
-              <a:rPr lang="en-US" dirty="0" err="1" smtClean="0"/>
+              <a:rPr lang="en-US" dirty="0" err="1"/>
               <a:t>egy</a:t>
             </a:r>
             <a:r>
-              <a:rPr lang="en-US" dirty="0" smtClean="0"/>
-              <a:t> </a:t>
-            </a:r>
-            <a:r>
-              <a:rPr lang="en-US" dirty="0" err="1" smtClean="0"/>
+              <a:rPr lang="en-US" dirty="0"/>
+              <a:t> </a:t>
+            </a:r>
+            <a:r>
+              <a:rPr lang="en-US" dirty="0" err="1"/>
               <a:t>megfelelő</a:t>
             </a:r>
             <a:r>
-              <a:rPr lang="en-US" dirty="0" smtClean="0"/>
-              <a:t> </a:t>
-            </a:r>
-            <a:r>
-              <a:rPr lang="en-US" dirty="0" err="1" smtClean="0"/>
+              <a:rPr lang="en-US" dirty="0"/>
+              <a:t> </a:t>
+            </a:r>
+            <a:r>
+              <a:rPr lang="en-US" dirty="0" err="1"/>
               <a:t>sugarú</a:t>
             </a:r>
             <a:r>
-              <a:rPr lang="en-US" dirty="0" smtClean="0"/>
-              <a:t> </a:t>
-            </a:r>
-            <a:r>
-              <a:rPr lang="en-US" dirty="0" err="1" smtClean="0"/>
+              <a:rPr lang="en-US" dirty="0"/>
+              <a:t> </a:t>
+            </a:r>
+            <a:r>
+              <a:rPr lang="en-US" dirty="0" err="1"/>
               <a:t>gömbbel</a:t>
             </a:r>
             <a:r>
-              <a:rPr lang="en-US" dirty="0" smtClean="0"/>
-              <a:t> </a:t>
-            </a:r>
-            <a:r>
-              <a:rPr lang="en-US" dirty="0" err="1" smtClean="0"/>
+              <a:rPr lang="en-US" dirty="0"/>
+              <a:t> </a:t>
+            </a:r>
+            <a:r>
+              <a:rPr lang="en-US" dirty="0" err="1"/>
               <a:t>közelítjük</a:t>
             </a:r>
             <a:r>
-              <a:rPr lang="en-US" dirty="0" smtClean="0"/>
+              <a:rPr lang="en-US" dirty="0"/>
               <a:t>.</a:t>
             </a:r>
-            <a:endParaRPr lang="en-US" dirty="0"/>
-          </a:p>
-        </p:txBody>
-      </p:sp>
+          </a:p>
+        </p:txBody>
+      </p:sp>
+      <p:pic>
+        <p:nvPicPr>
+          <p:cNvPr id="5" name="Graphic 4">
+            <a:extLst>
+              <a:ext uri="{FF2B5EF4-FFF2-40B4-BE49-F238E27FC236}">
+                <a16:creationId xmlns:a16="http://schemas.microsoft.com/office/drawing/2014/main" id="{4E629F32-0AE6-4734-BED4-A66193799410}"/>
+              </a:ext>
+            </a:extLst>
+          </p:cNvPr>
+          <p:cNvPicPr>
+            <a:picLocks noChangeAspect="1"/>
+          </p:cNvPicPr>
+          <p:nvPr/>
+        </p:nvPicPr>
+        <p:blipFill>
+          <a:blip r:embed="rId2">
+            <a:extLst>
+              <a:ext uri="{28A0092B-C50C-407E-A947-70E740481C1C}">
+                <a14:useLocalDpi xmlns:a14="http://schemas.microsoft.com/office/drawing/2010/main" val="0"/>
+              </a:ext>
+              <a:ext uri="{96DAC541-7B7A-43D3-8B79-37D633B846F1}">
+                <asvg:svgBlip xmlns:asvg="http://schemas.microsoft.com/office/drawing/2016/SVG/main" r:embed="rId3"/>
+              </a:ext>
+            </a:extLst>
+          </a:blip>
+          <a:stretch>
+            <a:fillRect/>
+          </a:stretch>
+        </p:blipFill>
+        <p:spPr>
+          <a:xfrm>
+            <a:off x="6442510" y="1845735"/>
+            <a:ext cx="4549542" cy="4319380"/>
+          </a:xfrm>
+          <a:prstGeom prst="rect">
+            <a:avLst/>
+          </a:prstGeom>
+        </p:spPr>
+      </p:pic>
     </p:spTree>
     <p:extLst>
       <p:ext uri="{BB962C8B-B14F-4D97-AF65-F5344CB8AC3E}">
@@ -6595,31 +6890,31 @@
           <a:lstStyle/>
           <a:p>
             <a:r>
-              <a:rPr lang="en-US" dirty="0" err="1" smtClean="0"/>
+              <a:rPr lang="en-US" dirty="0" err="1"/>
               <a:t>Az</a:t>
             </a:r>
             <a:r>
-              <a:rPr lang="en-US" dirty="0" smtClean="0"/>
-              <a:t> </a:t>
-            </a:r>
-            <a:r>
-              <a:rPr lang="en-US" dirty="0" err="1" smtClean="0"/>
+              <a:rPr lang="en-US" dirty="0"/>
+              <a:t> </a:t>
+            </a:r>
+            <a:r>
+              <a:rPr lang="en-US" dirty="0" err="1"/>
               <a:t>atmoszféra</a:t>
             </a:r>
             <a:r>
-              <a:rPr lang="en-US" dirty="0" smtClean="0"/>
-              <a:t> </a:t>
-            </a:r>
-            <a:r>
-              <a:rPr lang="en-US" dirty="0" err="1" smtClean="0"/>
+              <a:rPr lang="en-US" dirty="0"/>
+              <a:t> </a:t>
+            </a:r>
+            <a:r>
+              <a:rPr lang="en-US" dirty="0" err="1"/>
               <a:t>színének</a:t>
             </a:r>
             <a:r>
-              <a:rPr lang="en-US" dirty="0" smtClean="0"/>
-              <a:t> </a:t>
-            </a:r>
-            <a:r>
-              <a:rPr lang="en-US" dirty="0" err="1" smtClean="0"/>
+              <a:rPr lang="en-US" dirty="0"/>
+              <a:t> </a:t>
+            </a:r>
+            <a:r>
+              <a:rPr lang="en-US" dirty="0" err="1"/>
               <a:t>számítása</a:t>
             </a:r>
             <a:endParaRPr lang="en-US" dirty="0"/>
@@ -6636,107 +6931,126 @@
             <p:ph idx="1"/>
           </p:nvPr>
         </p:nvSpPr>
-        <p:spPr/>
+        <p:spPr>
+          <a:xfrm>
+            <a:off x="1097280" y="1845734"/>
+            <a:ext cx="4998720" cy="4023360"/>
+          </a:xfrm>
+        </p:spPr>
         <p:txBody>
           <a:bodyPr/>
           <a:lstStyle/>
           <a:p>
-            <a:r>
-              <a:rPr lang="en-US" dirty="0" smtClean="0"/>
+            <a:pPr algn="just"/>
+            <a:r>
+              <a:rPr lang="en-US" dirty="0"/>
               <a:t>A </a:t>
             </a:r>
             <a:r>
-              <a:rPr lang="en-US" dirty="0" err="1" smtClean="0"/>
+              <a:rPr lang="en-US" dirty="0" err="1"/>
               <a:t>kibocsátott</a:t>
             </a:r>
             <a:r>
-              <a:rPr lang="en-US" dirty="0" smtClean="0"/>
-              <a:t> sugar </a:t>
-            </a:r>
-            <a:r>
-              <a:rPr lang="en-US" dirty="0" err="1" smtClean="0"/>
+              <a:rPr lang="en-US" dirty="0"/>
+              <a:t> </a:t>
+            </a:r>
+            <a:r>
+              <a:rPr lang="en-US" dirty="0" err="1"/>
+              <a:t>sug</a:t>
+            </a:r>
+            <a:r>
+              <a:rPr lang="hu-HU" dirty="0"/>
+              <a:t>á</a:t>
+            </a:r>
+            <a:r>
+              <a:rPr lang="en-US" dirty="0"/>
+              <a:t>r </a:t>
+            </a:r>
+            <a:r>
+              <a:rPr lang="en-US" dirty="0" err="1"/>
               <a:t>atmoszférában</a:t>
             </a:r>
             <a:r>
-              <a:rPr lang="en-US" dirty="0" smtClean="0"/>
-              <a:t> </a:t>
-            </a:r>
-            <a:r>
-              <a:rPr lang="en-US" dirty="0" err="1" smtClean="0"/>
+              <a:rPr lang="en-US" dirty="0"/>
+              <a:t> </a:t>
+            </a:r>
+            <a:r>
+              <a:rPr lang="en-US" dirty="0" err="1"/>
               <a:t>található</a:t>
             </a:r>
             <a:r>
-              <a:rPr lang="en-US" dirty="0" smtClean="0"/>
-              <a:t> </a:t>
-            </a:r>
-            <a:r>
-              <a:rPr lang="en-US" dirty="0" err="1" smtClean="0"/>
+              <a:rPr lang="en-US" dirty="0"/>
+              <a:t> </a:t>
+            </a:r>
+            <a:r>
+              <a:rPr lang="en-US" dirty="0" err="1"/>
               <a:t>részét</a:t>
             </a:r>
             <a:r>
-              <a:rPr lang="en-US" dirty="0" smtClean="0"/>
-              <a:t> </a:t>
-            </a:r>
-            <a:r>
-              <a:rPr lang="en-US" dirty="0" err="1" smtClean="0"/>
+              <a:rPr lang="en-US" dirty="0"/>
+              <a:t> </a:t>
+            </a:r>
+            <a:r>
+              <a:rPr lang="en-US" dirty="0" err="1"/>
               <a:t>felosztjuk</a:t>
             </a:r>
             <a:r>
-              <a:rPr lang="en-US" dirty="0" smtClean="0"/>
-              <a:t> </a:t>
-            </a:r>
-            <a:r>
-              <a:rPr lang="en-US" dirty="0" err="1" smtClean="0"/>
+              <a:rPr lang="en-US" dirty="0"/>
+              <a:t> </a:t>
+            </a:r>
+            <a:r>
+              <a:rPr lang="en-US" dirty="0" err="1"/>
               <a:t>néhány</a:t>
             </a:r>
             <a:r>
-              <a:rPr lang="en-US" dirty="0" smtClean="0"/>
-              <a:t> </a:t>
-            </a:r>
-            <a:r>
-              <a:rPr lang="en-US" dirty="0" err="1" smtClean="0"/>
+              <a:rPr lang="en-US" dirty="0"/>
+              <a:t> </a:t>
+            </a:r>
+            <a:r>
+              <a:rPr lang="en-US" dirty="0" err="1"/>
               <a:t>diszkrét</a:t>
             </a:r>
             <a:r>
-              <a:rPr lang="en-US" dirty="0" smtClean="0"/>
-              <a:t> </a:t>
-            </a:r>
-            <a:r>
-              <a:rPr lang="en-US" dirty="0" err="1" smtClean="0"/>
+              <a:rPr lang="en-US" dirty="0"/>
+              <a:t> </a:t>
+            </a:r>
+            <a:r>
+              <a:rPr lang="en-US" dirty="0" err="1"/>
               <a:t>részre</a:t>
             </a:r>
             <a:r>
-              <a:rPr lang="en-US" dirty="0" smtClean="0"/>
+              <a:rPr lang="en-US" dirty="0"/>
               <a:t>.</a:t>
             </a:r>
           </a:p>
           <a:p>
-            <a:r>
-              <a:rPr lang="en-US" dirty="0" err="1" smtClean="0"/>
+            <a:pPr algn="just"/>
+            <a:r>
+              <a:rPr lang="en-US" dirty="0" err="1"/>
               <a:t>Az</a:t>
             </a:r>
             <a:r>
-              <a:rPr lang="en-US" dirty="0" smtClean="0"/>
-              <a:t> </a:t>
-            </a:r>
-            <a:r>
-              <a:rPr lang="en-US" dirty="0" err="1" smtClean="0"/>
+              <a:rPr lang="en-US" dirty="0"/>
+              <a:t> </a:t>
+            </a:r>
+            <a:r>
+              <a:rPr lang="en-US" dirty="0" err="1"/>
               <a:t>atmoszféra</a:t>
             </a:r>
             <a:r>
-              <a:rPr lang="en-US" dirty="0" smtClean="0"/>
-              <a:t> </a:t>
-            </a:r>
-            <a:r>
-              <a:rPr lang="en-US" dirty="0" err="1" smtClean="0"/>
+              <a:rPr lang="en-US" dirty="0"/>
+              <a:t> </a:t>
+            </a:r>
+            <a:r>
+              <a:rPr lang="en-US" dirty="0" err="1"/>
               <a:t>színét</a:t>
             </a:r>
             <a:r>
-              <a:rPr lang="en-US" dirty="0" smtClean="0"/>
-              <a:t> </a:t>
-            </a:r>
-            <a:r>
-              <a:rPr lang="en-US" dirty="0" err="1" smtClean="0"/>
+              <a:rPr lang="en-US" dirty="0"/>
+              <a:t> </a:t>
+            </a:r>
+            <a:r>
+              <a:rPr lang="en-US" dirty="0" err="1"/>
               <a:t>minden</a:t>
             </a:r>
             <a:r>
@@ -6744,319 +7058,374 @@
               <a:t> </a:t>
             </a:r>
             <a:r>
-              <a:rPr lang="en-US" dirty="0" err="1" smtClean="0"/>
+              <a:rPr lang="en-US" dirty="0" err="1"/>
               <a:t>egyes</a:t>
             </a:r>
             <a:r>
-              <a:rPr lang="en-US" dirty="0" smtClean="0"/>
-              <a:t> </a:t>
-            </a:r>
-            <a:r>
-              <a:rPr lang="en-US" dirty="0" err="1" smtClean="0"/>
+              <a:rPr lang="en-US" dirty="0"/>
+              <a:t> </a:t>
+            </a:r>
+            <a:r>
+              <a:rPr lang="en-US" dirty="0" err="1"/>
               <a:t>szakaszra</a:t>
             </a:r>
             <a:r>
-              <a:rPr lang="en-US" dirty="0" smtClean="0"/>
-              <a:t> </a:t>
-            </a:r>
-            <a:r>
-              <a:rPr lang="en-US" dirty="0" err="1" smtClean="0"/>
+              <a:rPr lang="en-US" dirty="0"/>
+              <a:t> </a:t>
+            </a:r>
+            <a:r>
+              <a:rPr lang="en-US" dirty="0" err="1"/>
               <a:t>kiszámoljuk</a:t>
             </a:r>
             <a:r>
-              <a:rPr lang="en-US" dirty="0" smtClean="0"/>
+              <a:rPr lang="en-US" dirty="0"/>
               <a:t>, </a:t>
             </a:r>
             <a:r>
-              <a:rPr lang="en-US" dirty="0" err="1" smtClean="0"/>
+              <a:rPr lang="en-US" dirty="0" err="1"/>
               <a:t>majd</a:t>
             </a:r>
             <a:r>
-              <a:rPr lang="en-US" dirty="0" smtClean="0"/>
-              <a:t> </a:t>
-            </a:r>
-            <a:r>
-              <a:rPr lang="en-US" dirty="0" err="1" smtClean="0"/>
+              <a:rPr lang="en-US" dirty="0"/>
+              <a:t> </a:t>
+            </a:r>
+            <a:r>
+              <a:rPr lang="en-US" dirty="0" err="1"/>
               <a:t>végül</a:t>
             </a:r>
             <a:r>
-              <a:rPr lang="en-US" dirty="0" smtClean="0"/>
+              <a:rPr lang="en-US" dirty="0"/>
               <a:t> a </a:t>
             </a:r>
             <a:r>
-              <a:rPr lang="en-US" dirty="0" err="1" smtClean="0"/>
+              <a:rPr lang="en-US" dirty="0" err="1"/>
               <a:t>kapott</a:t>
             </a:r>
             <a:r>
-              <a:rPr lang="en-US" dirty="0" smtClean="0"/>
-              <a:t> </a:t>
-            </a:r>
-            <a:r>
-              <a:rPr lang="en-US" dirty="0" err="1" smtClean="0"/>
+              <a:rPr lang="en-US" dirty="0"/>
+              <a:t> </a:t>
+            </a:r>
+            <a:r>
+              <a:rPr lang="en-US" dirty="0" err="1"/>
               <a:t>eredményt</a:t>
             </a:r>
             <a:r>
-              <a:rPr lang="en-US" dirty="0" smtClean="0"/>
-              <a:t> </a:t>
-            </a:r>
-            <a:r>
-              <a:rPr lang="en-US" dirty="0" err="1" smtClean="0"/>
+              <a:rPr lang="en-US" dirty="0"/>
+              <a:t> </a:t>
+            </a:r>
+            <a:r>
+              <a:rPr lang="en-US" dirty="0" err="1"/>
               <a:t>összegezzük</a:t>
             </a:r>
             <a:r>
-              <a:rPr lang="en-US" dirty="0" smtClean="0"/>
+              <a:rPr lang="en-US" dirty="0"/>
               <a:t>.</a:t>
             </a:r>
           </a:p>
           <a:p>
-            <a:r>
-              <a:rPr lang="en-US" dirty="0" smtClean="0"/>
+            <a:pPr algn="just"/>
+            <a:r>
+              <a:rPr lang="en-US" dirty="0"/>
               <a:t>A </a:t>
             </a:r>
             <a:r>
-              <a:rPr lang="en-US" dirty="0" err="1" smtClean="0"/>
+              <a:rPr lang="hu-HU" dirty="0"/>
               <a:t>színt</a:t>
             </a:r>
             <a:r>
-              <a:rPr lang="en-US" dirty="0" smtClean="0"/>
-              <a:t> </a:t>
-            </a:r>
-            <a:r>
-              <a:rPr lang="en-US" dirty="0" err="1" smtClean="0"/>
+              <a:rPr lang="en-US" dirty="0"/>
+              <a:t> </a:t>
+            </a:r>
+            <a:r>
+              <a:rPr lang="en-US" dirty="0" err="1"/>
               <a:t>az</a:t>
             </a:r>
             <a:r>
-              <a:rPr lang="en-US" dirty="0" smtClean="0"/>
-              <a:t> </a:t>
-            </a:r>
-            <a:r>
-              <a:rPr lang="en-US" dirty="0" err="1" smtClean="0"/>
+              <a:rPr lang="en-US" dirty="0"/>
+              <a:t> </a:t>
+            </a:r>
+            <a:r>
+              <a:rPr lang="en-US" dirty="0" err="1"/>
               <a:t>egyes</a:t>
             </a:r>
             <a:r>
-              <a:rPr lang="en-US" dirty="0" smtClean="0"/>
-              <a:t> </a:t>
-            </a:r>
-            <a:r>
-              <a:rPr lang="en-US" dirty="0" err="1" smtClean="0"/>
+              <a:rPr lang="en-US" dirty="0"/>
+              <a:t> </a:t>
+            </a:r>
+            <a:r>
+              <a:rPr lang="en-US" dirty="0" err="1"/>
               <a:t>szakaszok</a:t>
             </a:r>
             <a:r>
-              <a:rPr lang="en-US" dirty="0" smtClean="0"/>
-              <a:t> </a:t>
-            </a:r>
-            <a:r>
-              <a:rPr lang="en-US" dirty="0" err="1" smtClean="0"/>
+              <a:rPr lang="en-US" dirty="0"/>
+              <a:t> </a:t>
+            </a:r>
+            <a:r>
+              <a:rPr lang="en-US" dirty="0" err="1"/>
               <a:t>kezdőponjainál</a:t>
             </a:r>
             <a:r>
-              <a:rPr lang="en-US" dirty="0" smtClean="0"/>
-              <a:t> </a:t>
-            </a:r>
-            <a:r>
-              <a:rPr lang="en-US" dirty="0" err="1" smtClean="0"/>
+              <a:rPr lang="en-US" dirty="0"/>
+              <a:t> </a:t>
+            </a:r>
+            <a:r>
+              <a:rPr lang="en-US" dirty="0" err="1"/>
               <a:t>számoljuk</a:t>
             </a:r>
             <a:r>
-              <a:rPr lang="en-US" dirty="0" smtClean="0"/>
-              <a:t> </a:t>
-            </a:r>
-            <a:r>
-              <a:rPr lang="en-US" dirty="0" err="1" smtClean="0"/>
+              <a:rPr lang="en-US" dirty="0"/>
+              <a:t> </a:t>
+            </a:r>
+            <a:r>
+              <a:rPr lang="en-US" dirty="0" err="1"/>
               <a:t>aszerint</a:t>
             </a:r>
             <a:r>
-              <a:rPr lang="en-US" dirty="0" smtClean="0"/>
-              <a:t> </a:t>
-            </a:r>
-            <a:r>
-              <a:rPr lang="en-US" dirty="0" err="1" smtClean="0"/>
+              <a:rPr lang="hu-HU" dirty="0"/>
+              <a:t>,</a:t>
+            </a:r>
+            <a:r>
+              <a:rPr lang="en-US" dirty="0"/>
+              <a:t> </a:t>
+            </a:r>
+            <a:r>
+              <a:rPr lang="en-US" dirty="0" err="1"/>
               <a:t>hogy</a:t>
             </a:r>
             <a:r>
-              <a:rPr lang="en-US" dirty="0" smtClean="0"/>
-              <a:t> </a:t>
-            </a:r>
-            <a:r>
-              <a:rPr lang="en-US" dirty="0" err="1" smtClean="0"/>
+              <a:rPr lang="en-US" dirty="0"/>
+              <a:t> </a:t>
+            </a:r>
+            <a:r>
+              <a:rPr lang="en-US" dirty="0" err="1"/>
               <a:t>az</a:t>
             </a:r>
             <a:r>
-              <a:rPr lang="en-US" dirty="0" smtClean="0"/>
-              <a:t> </a:t>
-            </a:r>
-            <a:r>
-              <a:rPr lang="en-US" dirty="0" err="1" smtClean="0"/>
+              <a:rPr lang="en-US" dirty="0"/>
+              <a:t> </a:t>
+            </a:r>
+            <a:r>
+              <a:rPr lang="en-US" dirty="0" err="1"/>
               <a:t>adott</a:t>
             </a:r>
             <a:r>
-              <a:rPr lang="en-US" dirty="0" smtClean="0"/>
-              <a:t> </a:t>
-            </a:r>
-            <a:r>
-              <a:rPr lang="en-US" dirty="0" err="1" smtClean="0"/>
+              <a:rPr lang="en-US" dirty="0"/>
+              <a:t> </a:t>
+            </a:r>
+            <a:r>
+              <a:rPr lang="en-US" dirty="0" err="1"/>
               <a:t>pontba</a:t>
             </a:r>
             <a:r>
-              <a:rPr lang="en-US" dirty="0" smtClean="0"/>
-              <a:t> </a:t>
-            </a:r>
-            <a:r>
-              <a:rPr lang="en-US" dirty="0" err="1" smtClean="0"/>
+              <a:rPr lang="en-US" dirty="0"/>
+              <a:t> </a:t>
+            </a:r>
+            <a:r>
+              <a:rPr lang="en-US" dirty="0" err="1"/>
               <a:t>mennyi</a:t>
             </a:r>
             <a:r>
-              <a:rPr lang="en-US" dirty="0" smtClean="0"/>
-              <a:t> </a:t>
-            </a:r>
-            <a:r>
-              <a:rPr lang="en-US" dirty="0" err="1" smtClean="0"/>
+              <a:rPr lang="en-US" dirty="0"/>
+              <a:t> </a:t>
+            </a:r>
+            <a:r>
+              <a:rPr lang="en-US" dirty="0" err="1"/>
               <a:t>fény</a:t>
             </a:r>
             <a:r>
-              <a:rPr lang="en-US" dirty="0" smtClean="0"/>
-              <a:t> junta el, </a:t>
-            </a:r>
-            <a:r>
-              <a:rPr lang="en-US" dirty="0" err="1" smtClean="0"/>
+              <a:rPr lang="en-US" dirty="0"/>
+              <a:t> jut</a:t>
+            </a:r>
+            <a:r>
+              <a:rPr lang="hu-HU" dirty="0"/>
+              <a:t> </a:t>
+            </a:r>
+            <a:r>
+              <a:rPr lang="en-US" dirty="0" err="1"/>
+              <a:t>el</a:t>
+            </a:r>
+            <a:r>
+              <a:rPr lang="en-US" dirty="0"/>
+              <a:t>, </a:t>
+            </a:r>
+            <a:r>
+              <a:rPr lang="en-US" dirty="0" err="1"/>
               <a:t>illetve</a:t>
             </a:r>
             <a:r>
-              <a:rPr lang="en-US" dirty="0" smtClean="0"/>
+              <a:rPr lang="en-US" dirty="0"/>
               <a:t>, </a:t>
             </a:r>
             <a:r>
-              <a:rPr lang="en-US" dirty="0" err="1" smtClean="0"/>
+              <a:rPr lang="en-US" dirty="0" err="1"/>
               <a:t>hogy</a:t>
             </a:r>
             <a:r>
-              <a:rPr lang="en-US" dirty="0" smtClean="0"/>
+              <a:rPr lang="en-US" dirty="0"/>
               <a:t> mi </a:t>
             </a:r>
             <a:r>
-              <a:rPr lang="en-US" dirty="0" err="1" smtClean="0"/>
+              <a:rPr lang="en-US" dirty="0" err="1"/>
               <a:t>az</a:t>
             </a:r>
             <a:r>
-              <a:rPr lang="en-US" dirty="0" smtClean="0"/>
-              <a:t> </a:t>
-            </a:r>
-            <a:r>
-              <a:rPr lang="en-US" dirty="0" err="1" smtClean="0"/>
+              <a:rPr lang="en-US" dirty="0"/>
+              <a:t> </a:t>
+            </a:r>
+            <a:r>
+              <a:rPr lang="en-US" dirty="0" err="1"/>
               <a:t>esélye</a:t>
             </a:r>
             <a:r>
-              <a:rPr lang="en-US" dirty="0" smtClean="0"/>
-              <a:t> </a:t>
-            </a:r>
-            <a:r>
-              <a:rPr lang="en-US" dirty="0" err="1" smtClean="0"/>
+              <a:rPr lang="en-US" dirty="0"/>
+              <a:t> </a:t>
+            </a:r>
+            <a:r>
+              <a:rPr lang="en-US" dirty="0" err="1"/>
               <a:t>annak</a:t>
             </a:r>
             <a:r>
-              <a:rPr lang="en-US" dirty="0" smtClean="0"/>
+              <a:rPr lang="en-US" dirty="0"/>
               <a:t>, </a:t>
             </a:r>
             <a:r>
-              <a:rPr lang="en-US" dirty="0" err="1" smtClean="0"/>
+              <a:rPr lang="en-US" dirty="0" err="1"/>
               <a:t>hogy</a:t>
             </a:r>
             <a:r>
-              <a:rPr lang="en-US" dirty="0" smtClean="0"/>
-              <a:t> </a:t>
-            </a:r>
-            <a:r>
-              <a:rPr lang="en-US" dirty="0" err="1" smtClean="0"/>
+              <a:rPr lang="en-US" dirty="0"/>
+              <a:t> </a:t>
+            </a:r>
+            <a:r>
+              <a:rPr lang="en-US" dirty="0" err="1"/>
               <a:t>az</a:t>
             </a:r>
             <a:r>
-              <a:rPr lang="en-US" dirty="0" smtClean="0"/>
-              <a:t> </a:t>
-            </a:r>
-            <a:r>
-              <a:rPr lang="en-US" dirty="0" err="1" smtClean="0"/>
+              <a:rPr lang="en-US" dirty="0"/>
+              <a:t> </a:t>
+            </a:r>
+            <a:r>
+              <a:rPr lang="en-US" dirty="0" err="1"/>
               <a:t>adott</a:t>
             </a:r>
             <a:r>
-              <a:rPr lang="en-US" dirty="0" smtClean="0"/>
-              <a:t> </a:t>
-            </a:r>
-            <a:r>
-              <a:rPr lang="en-US" dirty="0" err="1" smtClean="0"/>
+              <a:rPr lang="en-US" dirty="0"/>
+              <a:t> </a:t>
+            </a:r>
+            <a:r>
+              <a:rPr lang="en-US" dirty="0" err="1"/>
               <a:t>pontból</a:t>
             </a:r>
             <a:r>
-              <a:rPr lang="en-US" dirty="0" smtClean="0"/>
-              <a:t> </a:t>
-            </a:r>
-            <a:r>
-              <a:rPr lang="en-US" dirty="0" err="1" smtClean="0"/>
+              <a:rPr lang="en-US" dirty="0"/>
+              <a:t> </a:t>
+            </a:r>
+            <a:r>
+              <a:rPr lang="en-US" dirty="0" err="1"/>
               <a:t>az</a:t>
             </a:r>
             <a:r>
-              <a:rPr lang="en-US" dirty="0" smtClean="0"/>
-              <a:t> </a:t>
-            </a:r>
-            <a:r>
-              <a:rPr lang="en-US" dirty="0" err="1" smtClean="0"/>
+              <a:rPr lang="en-US" dirty="0"/>
+              <a:t> </a:t>
+            </a:r>
+            <a:r>
+              <a:rPr lang="en-US" dirty="0" err="1"/>
               <a:t>oda</a:t>
             </a:r>
             <a:r>
-              <a:rPr lang="en-US" dirty="0" smtClean="0"/>
-              <a:t> </a:t>
-            </a:r>
-            <a:r>
-              <a:rPr lang="en-US" dirty="0" err="1" smtClean="0"/>
+              <a:rPr lang="en-US" dirty="0"/>
+              <a:t> </a:t>
+            </a:r>
+            <a:r>
+              <a:rPr lang="en-US" dirty="0" err="1"/>
               <a:t>jutott</a:t>
             </a:r>
             <a:r>
-              <a:rPr lang="en-US" dirty="0" smtClean="0"/>
-              <a:t> </a:t>
-            </a:r>
-            <a:r>
-              <a:rPr lang="en-US" dirty="0" err="1" smtClean="0"/>
+              <a:rPr lang="en-US" dirty="0"/>
+              <a:t> </a:t>
+            </a:r>
+            <a:r>
+              <a:rPr lang="en-US" dirty="0" err="1"/>
               <a:t>fény</a:t>
             </a:r>
             <a:r>
-              <a:rPr lang="en-US" dirty="0" smtClean="0"/>
-              <a:t> </a:t>
-            </a:r>
-            <a:r>
-              <a:rPr lang="en-US" dirty="0" err="1" smtClean="0"/>
+              <a:rPr lang="en-US" dirty="0"/>
+              <a:t> </a:t>
+            </a:r>
+            <a:r>
+              <a:rPr lang="en-US" dirty="0" err="1"/>
               <a:t>pont</a:t>
             </a:r>
             <a:r>
-              <a:rPr lang="en-US" dirty="0" smtClean="0"/>
+              <a:rPr lang="en-US" dirty="0"/>
               <a:t> a </a:t>
             </a:r>
             <a:r>
-              <a:rPr lang="en-US" dirty="0" err="1" smtClean="0"/>
+              <a:rPr lang="en-US" dirty="0" err="1"/>
               <a:t>szemlélő</a:t>
             </a:r>
             <a:r>
-              <a:rPr lang="en-US" dirty="0" smtClean="0"/>
-              <a:t> </a:t>
-            </a:r>
-            <a:r>
-              <a:rPr lang="en-US" dirty="0" err="1" smtClean="0"/>
+              <a:rPr lang="en-US" dirty="0"/>
+              <a:t> </a:t>
+            </a:r>
+            <a:r>
+              <a:rPr lang="en-US" dirty="0" err="1"/>
               <a:t>irányába</a:t>
             </a:r>
             <a:r>
-              <a:rPr lang="en-US" dirty="0" smtClean="0"/>
-              <a:t> </a:t>
-            </a:r>
-            <a:r>
-              <a:rPr lang="en-US" dirty="0" err="1" smtClean="0"/>
+              <a:rPr lang="en-US" dirty="0"/>
+              <a:t> </a:t>
+            </a:r>
+            <a:r>
+              <a:rPr lang="en-US" dirty="0" err="1"/>
               <a:t>törjön</a:t>
             </a:r>
             <a:r>
-              <a:rPr lang="en-US" dirty="0" smtClean="0"/>
+              <a:rPr lang="en-US" dirty="0"/>
               <a:t>.</a:t>
             </a:r>
-            <a:endParaRPr lang="en-US" dirty="0"/>
-          </a:p>
-        </p:txBody>
-      </p:sp>
+          </a:p>
+        </p:txBody>
+      </p:sp>
+      <p:pic>
+        <p:nvPicPr>
+          <p:cNvPr id="5" name="Graphic 4">
+            <a:extLst>
+              <a:ext uri="{FF2B5EF4-FFF2-40B4-BE49-F238E27FC236}">
+                <a16:creationId xmlns:a16="http://schemas.microsoft.com/office/drawing/2014/main" id="{7059C900-9764-4FB3-8031-0587AD3A2996}"/>
+              </a:ext>
+            </a:extLst>
+          </p:cNvPr>
+          <p:cNvPicPr>
+            <a:picLocks noChangeAspect="1"/>
+          </p:cNvPicPr>
+          <p:nvPr/>
+        </p:nvPicPr>
+        <p:blipFill>
+          <a:blip r:embed="rId2">
+            <a:extLst>
+              <a:ext uri="{28A0092B-C50C-407E-A947-70E740481C1C}">
+                <a14:useLocalDpi xmlns:a14="http://schemas.microsoft.com/office/drawing/2010/main" val="0"/>
+              </a:ext>
+              <a:ext uri="{96DAC541-7B7A-43D3-8B79-37D633B846F1}">
+                <asvg:svgBlip xmlns:asvg="http://schemas.microsoft.com/office/drawing/2016/SVG/main" r:embed="rId3"/>
+              </a:ext>
+            </a:extLst>
+          </a:blip>
+          <a:stretch>
+            <a:fillRect/>
+          </a:stretch>
+        </p:blipFill>
+        <p:spPr>
+          <a:xfrm>
+            <a:off x="6126480" y="1845734"/>
+            <a:ext cx="5029200" cy="2788247"/>
+          </a:xfrm>
+          <a:prstGeom prst="rect">
+            <a:avLst/>
+          </a:prstGeom>
+        </p:spPr>
+      </p:pic>
     </p:spTree>
     <p:extLst>
       <p:ext uri="{BB962C8B-B14F-4D97-AF65-F5344CB8AC3E}">

</xml_diff>